<commit_message>
[2017-03-07] 3주차 초안 완료
</commit_message>
<xml_diff>
--- a/doc/게시판 프로젝트 2차 - 김명준.pptx
+++ b/doc/게시판 프로젝트 2차 - 김명준.pptx
@@ -5,20 +5,31 @@
     <p:sldMasterId id="2147483648" r:id="rId1"/>
   </p:sldMasterIdLst>
   <p:notesMasterIdLst>
-    <p:notesMasterId r:id="rId10"/>
+    <p:notesMasterId r:id="rId21"/>
   </p:notesMasterIdLst>
   <p:handoutMasterIdLst>
-    <p:handoutMasterId r:id="rId11"/>
+    <p:handoutMasterId r:id="rId22"/>
   </p:handoutMasterIdLst>
   <p:sldIdLst>
     <p:sldId id="262" r:id="rId2"/>
-    <p:sldId id="320" r:id="rId3"/>
-    <p:sldId id="326" r:id="rId4"/>
-    <p:sldId id="323" r:id="rId5"/>
-    <p:sldId id="324" r:id="rId6"/>
-    <p:sldId id="322" r:id="rId7"/>
-    <p:sldId id="325" r:id="rId8"/>
-    <p:sldId id="260" r:id="rId9"/>
+    <p:sldId id="339" r:id="rId3"/>
+    <p:sldId id="320" r:id="rId4"/>
+    <p:sldId id="326" r:id="rId5"/>
+    <p:sldId id="335" r:id="rId6"/>
+    <p:sldId id="323" r:id="rId7"/>
+    <p:sldId id="333" r:id="rId8"/>
+    <p:sldId id="334" r:id="rId9"/>
+    <p:sldId id="324" r:id="rId10"/>
+    <p:sldId id="332" r:id="rId11"/>
+    <p:sldId id="336" r:id="rId12"/>
+    <p:sldId id="337" r:id="rId13"/>
+    <p:sldId id="338" r:id="rId14"/>
+    <p:sldId id="327" r:id="rId15"/>
+    <p:sldId id="328" r:id="rId16"/>
+    <p:sldId id="329" r:id="rId17"/>
+    <p:sldId id="330" r:id="rId18"/>
+    <p:sldId id="331" r:id="rId19"/>
+    <p:sldId id="260" r:id="rId20"/>
   </p:sldIdLst>
   <p:sldSz cx="9144000" cy="6858000" type="screen4x3"/>
   <p:notesSz cx="6797675" cy="9926638"/>
@@ -202,7 +213,7 @@
           <a:p>
             <a:fld id="{B91EE508-E6D0-4648-B6D2-38C44CE8FAAB}" type="datetimeFigureOut">
               <a:rPr lang="ko-KR" altLang="en-US" smtClean="0"/>
-              <a:t>2017-03-02</a:t>
+              <a:t>2017-03-03</a:t>
             </a:fld>
             <a:endParaRPr lang="ko-KR" altLang="en-US"/>
           </a:p>
@@ -367,7 +378,7 @@
           <a:p>
             <a:fld id="{7C1CF068-DEA1-4643-B807-89A7146A4070}" type="datetimeFigureOut">
               <a:rPr lang="ko-KR" altLang="en-US" smtClean="0"/>
-              <a:t>2017-03-02</a:t>
+              <a:t>2017-03-03</a:t>
             </a:fld>
             <a:endParaRPr lang="ko-KR" altLang="en-US"/>
           </a:p>
@@ -719,6 +730,762 @@
 </p:notes>
 </file>
 
+<file path=ppt/notesSlides/notesSlide10.xml><?xml version="1.0" encoding="utf-8"?>
+<p:notes xmlns:a="http://schemas.openxmlformats.org/drawingml/2006/main" xmlns:r="http://schemas.openxmlformats.org/officeDocument/2006/relationships" xmlns:p="http://schemas.openxmlformats.org/presentationml/2006/main">
+  <p:cSld>
+    <p:spTree>
+      <p:nvGrpSpPr>
+        <p:cNvPr id="1" name=""/>
+        <p:cNvGrpSpPr/>
+        <p:nvPr/>
+      </p:nvGrpSpPr>
+      <p:grpSpPr>
+        <a:xfrm>
+          <a:off x="0" y="0"/>
+          <a:ext cx="0" cy="0"/>
+          <a:chOff x="0" y="0"/>
+          <a:chExt cx="0" cy="0"/>
+        </a:xfrm>
+      </p:grpSpPr>
+      <p:sp>
+        <p:nvSpPr>
+          <p:cNvPr id="2" name="슬라이드 이미지 개체 틀 1"/>
+          <p:cNvSpPr>
+            <a:spLocks noGrp="1" noRot="1" noChangeAspect="1"/>
+          </p:cNvSpPr>
+          <p:nvPr>
+            <p:ph type="sldImg"/>
+          </p:nvPr>
+        </p:nvSpPr>
+        <p:spPr/>
+      </p:sp>
+      <p:sp>
+        <p:nvSpPr>
+          <p:cNvPr id="3" name="슬라이드 노트 개체 틀 2"/>
+          <p:cNvSpPr>
+            <a:spLocks noGrp="1"/>
+          </p:cNvSpPr>
+          <p:nvPr>
+            <p:ph type="body" idx="1"/>
+          </p:nvPr>
+        </p:nvSpPr>
+        <p:spPr/>
+        <p:txBody>
+          <a:bodyPr/>
+          <a:lstStyle/>
+          <a:p>
+            <a:endParaRPr lang="ko-KR" altLang="en-US" dirty="0"/>
+          </a:p>
+        </p:txBody>
+      </p:sp>
+      <p:sp>
+        <p:nvSpPr>
+          <p:cNvPr id="4" name="슬라이드 번호 개체 틀 3"/>
+          <p:cNvSpPr>
+            <a:spLocks noGrp="1"/>
+          </p:cNvSpPr>
+          <p:nvPr>
+            <p:ph type="sldNum" sz="quarter" idx="10"/>
+          </p:nvPr>
+        </p:nvSpPr>
+        <p:spPr/>
+        <p:txBody>
+          <a:bodyPr/>
+          <a:lstStyle/>
+          <a:p>
+            <a:fld id="{F9FBCD24-FD72-452C-8969-09628A5F2BDD}" type="slidenum">
+              <a:rPr lang="ko-KR" altLang="en-US" smtClean="0"/>
+              <a:t>10</a:t>
+            </a:fld>
+            <a:endParaRPr lang="ko-KR" altLang="en-US"/>
+          </a:p>
+        </p:txBody>
+      </p:sp>
+    </p:spTree>
+    <p:extLst>
+      <p:ext uri="{BB962C8B-B14F-4D97-AF65-F5344CB8AC3E}">
+        <p14:creationId xmlns:p14="http://schemas.microsoft.com/office/powerpoint/2010/main" val="366670249"/>
+      </p:ext>
+    </p:extLst>
+  </p:cSld>
+  <p:clrMapOvr>
+    <a:masterClrMapping/>
+  </p:clrMapOvr>
+</p:notes>
+</file>
+
+<file path=ppt/notesSlides/notesSlide11.xml><?xml version="1.0" encoding="utf-8"?>
+<p:notes xmlns:a="http://schemas.openxmlformats.org/drawingml/2006/main" xmlns:r="http://schemas.openxmlformats.org/officeDocument/2006/relationships" xmlns:p="http://schemas.openxmlformats.org/presentationml/2006/main">
+  <p:cSld>
+    <p:spTree>
+      <p:nvGrpSpPr>
+        <p:cNvPr id="1" name=""/>
+        <p:cNvGrpSpPr/>
+        <p:nvPr/>
+      </p:nvGrpSpPr>
+      <p:grpSpPr>
+        <a:xfrm>
+          <a:off x="0" y="0"/>
+          <a:ext cx="0" cy="0"/>
+          <a:chOff x="0" y="0"/>
+          <a:chExt cx="0" cy="0"/>
+        </a:xfrm>
+      </p:grpSpPr>
+      <p:sp>
+        <p:nvSpPr>
+          <p:cNvPr id="2" name="슬라이드 이미지 개체 틀 1"/>
+          <p:cNvSpPr>
+            <a:spLocks noGrp="1" noRot="1" noChangeAspect="1"/>
+          </p:cNvSpPr>
+          <p:nvPr>
+            <p:ph type="sldImg"/>
+          </p:nvPr>
+        </p:nvSpPr>
+        <p:spPr/>
+      </p:sp>
+      <p:sp>
+        <p:nvSpPr>
+          <p:cNvPr id="3" name="슬라이드 노트 개체 틀 2"/>
+          <p:cNvSpPr>
+            <a:spLocks noGrp="1"/>
+          </p:cNvSpPr>
+          <p:nvPr>
+            <p:ph type="body" idx="1"/>
+          </p:nvPr>
+        </p:nvSpPr>
+        <p:spPr/>
+        <p:txBody>
+          <a:bodyPr/>
+          <a:lstStyle/>
+          <a:p>
+            <a:endParaRPr lang="ko-KR" altLang="en-US" dirty="0"/>
+          </a:p>
+        </p:txBody>
+      </p:sp>
+      <p:sp>
+        <p:nvSpPr>
+          <p:cNvPr id="4" name="슬라이드 번호 개체 틀 3"/>
+          <p:cNvSpPr>
+            <a:spLocks noGrp="1"/>
+          </p:cNvSpPr>
+          <p:nvPr>
+            <p:ph type="sldNum" sz="quarter" idx="10"/>
+          </p:nvPr>
+        </p:nvSpPr>
+        <p:spPr/>
+        <p:txBody>
+          <a:bodyPr/>
+          <a:lstStyle/>
+          <a:p>
+            <a:fld id="{F9FBCD24-FD72-452C-8969-09628A5F2BDD}" type="slidenum">
+              <a:rPr lang="ko-KR" altLang="en-US" smtClean="0"/>
+              <a:t>11</a:t>
+            </a:fld>
+            <a:endParaRPr lang="ko-KR" altLang="en-US"/>
+          </a:p>
+        </p:txBody>
+      </p:sp>
+    </p:spTree>
+    <p:extLst>
+      <p:ext uri="{BB962C8B-B14F-4D97-AF65-F5344CB8AC3E}">
+        <p14:creationId xmlns:p14="http://schemas.microsoft.com/office/powerpoint/2010/main" val="366670249"/>
+      </p:ext>
+    </p:extLst>
+  </p:cSld>
+  <p:clrMapOvr>
+    <a:masterClrMapping/>
+  </p:clrMapOvr>
+</p:notes>
+</file>
+
+<file path=ppt/notesSlides/notesSlide12.xml><?xml version="1.0" encoding="utf-8"?>
+<p:notes xmlns:a="http://schemas.openxmlformats.org/drawingml/2006/main" xmlns:r="http://schemas.openxmlformats.org/officeDocument/2006/relationships" xmlns:p="http://schemas.openxmlformats.org/presentationml/2006/main">
+  <p:cSld>
+    <p:spTree>
+      <p:nvGrpSpPr>
+        <p:cNvPr id="1" name=""/>
+        <p:cNvGrpSpPr/>
+        <p:nvPr/>
+      </p:nvGrpSpPr>
+      <p:grpSpPr>
+        <a:xfrm>
+          <a:off x="0" y="0"/>
+          <a:ext cx="0" cy="0"/>
+          <a:chOff x="0" y="0"/>
+          <a:chExt cx="0" cy="0"/>
+        </a:xfrm>
+      </p:grpSpPr>
+      <p:sp>
+        <p:nvSpPr>
+          <p:cNvPr id="2" name="슬라이드 이미지 개체 틀 1"/>
+          <p:cNvSpPr>
+            <a:spLocks noGrp="1" noRot="1" noChangeAspect="1"/>
+          </p:cNvSpPr>
+          <p:nvPr>
+            <p:ph type="sldImg"/>
+          </p:nvPr>
+        </p:nvSpPr>
+        <p:spPr/>
+      </p:sp>
+      <p:sp>
+        <p:nvSpPr>
+          <p:cNvPr id="3" name="슬라이드 노트 개체 틀 2"/>
+          <p:cNvSpPr>
+            <a:spLocks noGrp="1"/>
+          </p:cNvSpPr>
+          <p:nvPr>
+            <p:ph type="body" idx="1"/>
+          </p:nvPr>
+        </p:nvSpPr>
+        <p:spPr/>
+        <p:txBody>
+          <a:bodyPr/>
+          <a:lstStyle/>
+          <a:p>
+            <a:endParaRPr lang="ko-KR" altLang="en-US" dirty="0"/>
+          </a:p>
+        </p:txBody>
+      </p:sp>
+      <p:sp>
+        <p:nvSpPr>
+          <p:cNvPr id="4" name="슬라이드 번호 개체 틀 3"/>
+          <p:cNvSpPr>
+            <a:spLocks noGrp="1"/>
+          </p:cNvSpPr>
+          <p:nvPr>
+            <p:ph type="sldNum" sz="quarter" idx="10"/>
+          </p:nvPr>
+        </p:nvSpPr>
+        <p:spPr/>
+        <p:txBody>
+          <a:bodyPr/>
+          <a:lstStyle/>
+          <a:p>
+            <a:fld id="{F9FBCD24-FD72-452C-8969-09628A5F2BDD}" type="slidenum">
+              <a:rPr lang="ko-KR" altLang="en-US" smtClean="0"/>
+              <a:t>12</a:t>
+            </a:fld>
+            <a:endParaRPr lang="ko-KR" altLang="en-US"/>
+          </a:p>
+        </p:txBody>
+      </p:sp>
+    </p:spTree>
+    <p:extLst>
+      <p:ext uri="{BB962C8B-B14F-4D97-AF65-F5344CB8AC3E}">
+        <p14:creationId xmlns:p14="http://schemas.microsoft.com/office/powerpoint/2010/main" val="366670249"/>
+      </p:ext>
+    </p:extLst>
+  </p:cSld>
+  <p:clrMapOvr>
+    <a:masterClrMapping/>
+  </p:clrMapOvr>
+</p:notes>
+</file>
+
+<file path=ppt/notesSlides/notesSlide13.xml><?xml version="1.0" encoding="utf-8"?>
+<p:notes xmlns:a="http://schemas.openxmlformats.org/drawingml/2006/main" xmlns:r="http://schemas.openxmlformats.org/officeDocument/2006/relationships" xmlns:p="http://schemas.openxmlformats.org/presentationml/2006/main">
+  <p:cSld>
+    <p:spTree>
+      <p:nvGrpSpPr>
+        <p:cNvPr id="1" name=""/>
+        <p:cNvGrpSpPr/>
+        <p:nvPr/>
+      </p:nvGrpSpPr>
+      <p:grpSpPr>
+        <a:xfrm>
+          <a:off x="0" y="0"/>
+          <a:ext cx="0" cy="0"/>
+          <a:chOff x="0" y="0"/>
+          <a:chExt cx="0" cy="0"/>
+        </a:xfrm>
+      </p:grpSpPr>
+      <p:sp>
+        <p:nvSpPr>
+          <p:cNvPr id="2" name="슬라이드 이미지 개체 틀 1"/>
+          <p:cNvSpPr>
+            <a:spLocks noGrp="1" noRot="1" noChangeAspect="1"/>
+          </p:cNvSpPr>
+          <p:nvPr>
+            <p:ph type="sldImg"/>
+          </p:nvPr>
+        </p:nvSpPr>
+        <p:spPr/>
+      </p:sp>
+      <p:sp>
+        <p:nvSpPr>
+          <p:cNvPr id="3" name="슬라이드 노트 개체 틀 2"/>
+          <p:cNvSpPr>
+            <a:spLocks noGrp="1"/>
+          </p:cNvSpPr>
+          <p:nvPr>
+            <p:ph type="body" idx="1"/>
+          </p:nvPr>
+        </p:nvSpPr>
+        <p:spPr/>
+        <p:txBody>
+          <a:bodyPr/>
+          <a:lstStyle/>
+          <a:p>
+            <a:endParaRPr lang="ko-KR" altLang="en-US" dirty="0"/>
+          </a:p>
+        </p:txBody>
+      </p:sp>
+      <p:sp>
+        <p:nvSpPr>
+          <p:cNvPr id="4" name="슬라이드 번호 개체 틀 3"/>
+          <p:cNvSpPr>
+            <a:spLocks noGrp="1"/>
+          </p:cNvSpPr>
+          <p:nvPr>
+            <p:ph type="sldNum" sz="quarter" idx="10"/>
+          </p:nvPr>
+        </p:nvSpPr>
+        <p:spPr/>
+        <p:txBody>
+          <a:bodyPr/>
+          <a:lstStyle/>
+          <a:p>
+            <a:fld id="{F9FBCD24-FD72-452C-8969-09628A5F2BDD}" type="slidenum">
+              <a:rPr lang="ko-KR" altLang="en-US" smtClean="0"/>
+              <a:t>13</a:t>
+            </a:fld>
+            <a:endParaRPr lang="ko-KR" altLang="en-US"/>
+          </a:p>
+        </p:txBody>
+      </p:sp>
+    </p:spTree>
+    <p:extLst>
+      <p:ext uri="{BB962C8B-B14F-4D97-AF65-F5344CB8AC3E}">
+        <p14:creationId xmlns:p14="http://schemas.microsoft.com/office/powerpoint/2010/main" val="366670249"/>
+      </p:ext>
+    </p:extLst>
+  </p:cSld>
+  <p:clrMapOvr>
+    <a:masterClrMapping/>
+  </p:clrMapOvr>
+</p:notes>
+</file>
+
+<file path=ppt/notesSlides/notesSlide14.xml><?xml version="1.0" encoding="utf-8"?>
+<p:notes xmlns:a="http://schemas.openxmlformats.org/drawingml/2006/main" xmlns:r="http://schemas.openxmlformats.org/officeDocument/2006/relationships" xmlns:p="http://schemas.openxmlformats.org/presentationml/2006/main">
+  <p:cSld>
+    <p:spTree>
+      <p:nvGrpSpPr>
+        <p:cNvPr id="1" name=""/>
+        <p:cNvGrpSpPr/>
+        <p:nvPr/>
+      </p:nvGrpSpPr>
+      <p:grpSpPr>
+        <a:xfrm>
+          <a:off x="0" y="0"/>
+          <a:ext cx="0" cy="0"/>
+          <a:chOff x="0" y="0"/>
+          <a:chExt cx="0" cy="0"/>
+        </a:xfrm>
+      </p:grpSpPr>
+      <p:sp>
+        <p:nvSpPr>
+          <p:cNvPr id="2" name="슬라이드 이미지 개체 틀 1"/>
+          <p:cNvSpPr>
+            <a:spLocks noGrp="1" noRot="1" noChangeAspect="1"/>
+          </p:cNvSpPr>
+          <p:nvPr>
+            <p:ph type="sldImg"/>
+          </p:nvPr>
+        </p:nvSpPr>
+        <p:spPr/>
+      </p:sp>
+      <p:sp>
+        <p:nvSpPr>
+          <p:cNvPr id="3" name="슬라이드 노트 개체 틀 2"/>
+          <p:cNvSpPr>
+            <a:spLocks noGrp="1"/>
+          </p:cNvSpPr>
+          <p:nvPr>
+            <p:ph type="body" idx="1"/>
+          </p:nvPr>
+        </p:nvSpPr>
+        <p:spPr/>
+        <p:txBody>
+          <a:bodyPr/>
+          <a:lstStyle/>
+          <a:p>
+            <a:endParaRPr lang="ko-KR" altLang="en-US" dirty="0"/>
+          </a:p>
+        </p:txBody>
+      </p:sp>
+      <p:sp>
+        <p:nvSpPr>
+          <p:cNvPr id="4" name="슬라이드 번호 개체 틀 3"/>
+          <p:cNvSpPr>
+            <a:spLocks noGrp="1"/>
+          </p:cNvSpPr>
+          <p:nvPr>
+            <p:ph type="sldNum" sz="quarter" idx="10"/>
+          </p:nvPr>
+        </p:nvSpPr>
+        <p:spPr/>
+        <p:txBody>
+          <a:bodyPr/>
+          <a:lstStyle/>
+          <a:p>
+            <a:fld id="{F9FBCD24-FD72-452C-8969-09628A5F2BDD}" type="slidenum">
+              <a:rPr lang="ko-KR" altLang="en-US" smtClean="0"/>
+              <a:t>14</a:t>
+            </a:fld>
+            <a:endParaRPr lang="ko-KR" altLang="en-US"/>
+          </a:p>
+        </p:txBody>
+      </p:sp>
+    </p:spTree>
+    <p:extLst>
+      <p:ext uri="{BB962C8B-B14F-4D97-AF65-F5344CB8AC3E}">
+        <p14:creationId xmlns:p14="http://schemas.microsoft.com/office/powerpoint/2010/main" val="366670249"/>
+      </p:ext>
+    </p:extLst>
+  </p:cSld>
+  <p:clrMapOvr>
+    <a:masterClrMapping/>
+  </p:clrMapOvr>
+</p:notes>
+</file>
+
+<file path=ppt/notesSlides/notesSlide15.xml><?xml version="1.0" encoding="utf-8"?>
+<p:notes xmlns:a="http://schemas.openxmlformats.org/drawingml/2006/main" xmlns:r="http://schemas.openxmlformats.org/officeDocument/2006/relationships" xmlns:p="http://schemas.openxmlformats.org/presentationml/2006/main">
+  <p:cSld>
+    <p:spTree>
+      <p:nvGrpSpPr>
+        <p:cNvPr id="1" name=""/>
+        <p:cNvGrpSpPr/>
+        <p:nvPr/>
+      </p:nvGrpSpPr>
+      <p:grpSpPr>
+        <a:xfrm>
+          <a:off x="0" y="0"/>
+          <a:ext cx="0" cy="0"/>
+          <a:chOff x="0" y="0"/>
+          <a:chExt cx="0" cy="0"/>
+        </a:xfrm>
+      </p:grpSpPr>
+      <p:sp>
+        <p:nvSpPr>
+          <p:cNvPr id="2" name="슬라이드 이미지 개체 틀 1"/>
+          <p:cNvSpPr>
+            <a:spLocks noGrp="1" noRot="1" noChangeAspect="1"/>
+          </p:cNvSpPr>
+          <p:nvPr>
+            <p:ph type="sldImg"/>
+          </p:nvPr>
+        </p:nvSpPr>
+        <p:spPr/>
+      </p:sp>
+      <p:sp>
+        <p:nvSpPr>
+          <p:cNvPr id="3" name="슬라이드 노트 개체 틀 2"/>
+          <p:cNvSpPr>
+            <a:spLocks noGrp="1"/>
+          </p:cNvSpPr>
+          <p:nvPr>
+            <p:ph type="body" idx="1"/>
+          </p:nvPr>
+        </p:nvSpPr>
+        <p:spPr/>
+        <p:txBody>
+          <a:bodyPr/>
+          <a:lstStyle/>
+          <a:p>
+            <a:endParaRPr lang="ko-KR" altLang="en-US" dirty="0"/>
+          </a:p>
+        </p:txBody>
+      </p:sp>
+      <p:sp>
+        <p:nvSpPr>
+          <p:cNvPr id="4" name="슬라이드 번호 개체 틀 3"/>
+          <p:cNvSpPr>
+            <a:spLocks noGrp="1"/>
+          </p:cNvSpPr>
+          <p:nvPr>
+            <p:ph type="sldNum" sz="quarter" idx="10"/>
+          </p:nvPr>
+        </p:nvSpPr>
+        <p:spPr/>
+        <p:txBody>
+          <a:bodyPr/>
+          <a:lstStyle/>
+          <a:p>
+            <a:fld id="{F9FBCD24-FD72-452C-8969-09628A5F2BDD}" type="slidenum">
+              <a:rPr lang="ko-KR" altLang="en-US" smtClean="0"/>
+              <a:t>15</a:t>
+            </a:fld>
+            <a:endParaRPr lang="ko-KR" altLang="en-US"/>
+          </a:p>
+        </p:txBody>
+      </p:sp>
+    </p:spTree>
+    <p:extLst>
+      <p:ext uri="{BB962C8B-B14F-4D97-AF65-F5344CB8AC3E}">
+        <p14:creationId xmlns:p14="http://schemas.microsoft.com/office/powerpoint/2010/main" val="366670249"/>
+      </p:ext>
+    </p:extLst>
+  </p:cSld>
+  <p:clrMapOvr>
+    <a:masterClrMapping/>
+  </p:clrMapOvr>
+</p:notes>
+</file>
+
+<file path=ppt/notesSlides/notesSlide16.xml><?xml version="1.0" encoding="utf-8"?>
+<p:notes xmlns:a="http://schemas.openxmlformats.org/drawingml/2006/main" xmlns:r="http://schemas.openxmlformats.org/officeDocument/2006/relationships" xmlns:p="http://schemas.openxmlformats.org/presentationml/2006/main">
+  <p:cSld>
+    <p:spTree>
+      <p:nvGrpSpPr>
+        <p:cNvPr id="1" name=""/>
+        <p:cNvGrpSpPr/>
+        <p:nvPr/>
+      </p:nvGrpSpPr>
+      <p:grpSpPr>
+        <a:xfrm>
+          <a:off x="0" y="0"/>
+          <a:ext cx="0" cy="0"/>
+          <a:chOff x="0" y="0"/>
+          <a:chExt cx="0" cy="0"/>
+        </a:xfrm>
+      </p:grpSpPr>
+      <p:sp>
+        <p:nvSpPr>
+          <p:cNvPr id="2" name="슬라이드 이미지 개체 틀 1"/>
+          <p:cNvSpPr>
+            <a:spLocks noGrp="1" noRot="1" noChangeAspect="1"/>
+          </p:cNvSpPr>
+          <p:nvPr>
+            <p:ph type="sldImg"/>
+          </p:nvPr>
+        </p:nvSpPr>
+        <p:spPr/>
+      </p:sp>
+      <p:sp>
+        <p:nvSpPr>
+          <p:cNvPr id="3" name="슬라이드 노트 개체 틀 2"/>
+          <p:cNvSpPr>
+            <a:spLocks noGrp="1"/>
+          </p:cNvSpPr>
+          <p:nvPr>
+            <p:ph type="body" idx="1"/>
+          </p:nvPr>
+        </p:nvSpPr>
+        <p:spPr/>
+        <p:txBody>
+          <a:bodyPr/>
+          <a:lstStyle/>
+          <a:p>
+            <a:endParaRPr lang="ko-KR" altLang="en-US" dirty="0"/>
+          </a:p>
+        </p:txBody>
+      </p:sp>
+      <p:sp>
+        <p:nvSpPr>
+          <p:cNvPr id="4" name="슬라이드 번호 개체 틀 3"/>
+          <p:cNvSpPr>
+            <a:spLocks noGrp="1"/>
+          </p:cNvSpPr>
+          <p:nvPr>
+            <p:ph type="sldNum" sz="quarter" idx="10"/>
+          </p:nvPr>
+        </p:nvSpPr>
+        <p:spPr/>
+        <p:txBody>
+          <a:bodyPr/>
+          <a:lstStyle/>
+          <a:p>
+            <a:fld id="{F9FBCD24-FD72-452C-8969-09628A5F2BDD}" type="slidenum">
+              <a:rPr lang="ko-KR" altLang="en-US" smtClean="0"/>
+              <a:t>16</a:t>
+            </a:fld>
+            <a:endParaRPr lang="ko-KR" altLang="en-US"/>
+          </a:p>
+        </p:txBody>
+      </p:sp>
+    </p:spTree>
+    <p:extLst>
+      <p:ext uri="{BB962C8B-B14F-4D97-AF65-F5344CB8AC3E}">
+        <p14:creationId xmlns:p14="http://schemas.microsoft.com/office/powerpoint/2010/main" val="366670249"/>
+      </p:ext>
+    </p:extLst>
+  </p:cSld>
+  <p:clrMapOvr>
+    <a:masterClrMapping/>
+  </p:clrMapOvr>
+</p:notes>
+</file>
+
+<file path=ppt/notesSlides/notesSlide17.xml><?xml version="1.0" encoding="utf-8"?>
+<p:notes xmlns:a="http://schemas.openxmlformats.org/drawingml/2006/main" xmlns:r="http://schemas.openxmlformats.org/officeDocument/2006/relationships" xmlns:p="http://schemas.openxmlformats.org/presentationml/2006/main">
+  <p:cSld>
+    <p:spTree>
+      <p:nvGrpSpPr>
+        <p:cNvPr id="1" name=""/>
+        <p:cNvGrpSpPr/>
+        <p:nvPr/>
+      </p:nvGrpSpPr>
+      <p:grpSpPr>
+        <a:xfrm>
+          <a:off x="0" y="0"/>
+          <a:ext cx="0" cy="0"/>
+          <a:chOff x="0" y="0"/>
+          <a:chExt cx="0" cy="0"/>
+        </a:xfrm>
+      </p:grpSpPr>
+      <p:sp>
+        <p:nvSpPr>
+          <p:cNvPr id="2" name="슬라이드 이미지 개체 틀 1"/>
+          <p:cNvSpPr>
+            <a:spLocks noGrp="1" noRot="1" noChangeAspect="1"/>
+          </p:cNvSpPr>
+          <p:nvPr>
+            <p:ph type="sldImg"/>
+          </p:nvPr>
+        </p:nvSpPr>
+        <p:spPr/>
+      </p:sp>
+      <p:sp>
+        <p:nvSpPr>
+          <p:cNvPr id="3" name="슬라이드 노트 개체 틀 2"/>
+          <p:cNvSpPr>
+            <a:spLocks noGrp="1"/>
+          </p:cNvSpPr>
+          <p:nvPr>
+            <p:ph type="body" idx="1"/>
+          </p:nvPr>
+        </p:nvSpPr>
+        <p:spPr/>
+        <p:txBody>
+          <a:bodyPr/>
+          <a:lstStyle/>
+          <a:p>
+            <a:endParaRPr lang="ko-KR" altLang="en-US" dirty="0"/>
+          </a:p>
+        </p:txBody>
+      </p:sp>
+      <p:sp>
+        <p:nvSpPr>
+          <p:cNvPr id="4" name="슬라이드 번호 개체 틀 3"/>
+          <p:cNvSpPr>
+            <a:spLocks noGrp="1"/>
+          </p:cNvSpPr>
+          <p:nvPr>
+            <p:ph type="sldNum" sz="quarter" idx="10"/>
+          </p:nvPr>
+        </p:nvSpPr>
+        <p:spPr/>
+        <p:txBody>
+          <a:bodyPr/>
+          <a:lstStyle/>
+          <a:p>
+            <a:fld id="{F9FBCD24-FD72-452C-8969-09628A5F2BDD}" type="slidenum">
+              <a:rPr lang="ko-KR" altLang="en-US" smtClean="0"/>
+              <a:t>17</a:t>
+            </a:fld>
+            <a:endParaRPr lang="ko-KR" altLang="en-US"/>
+          </a:p>
+        </p:txBody>
+      </p:sp>
+    </p:spTree>
+    <p:extLst>
+      <p:ext uri="{BB962C8B-B14F-4D97-AF65-F5344CB8AC3E}">
+        <p14:creationId xmlns:p14="http://schemas.microsoft.com/office/powerpoint/2010/main" val="366670249"/>
+      </p:ext>
+    </p:extLst>
+  </p:cSld>
+  <p:clrMapOvr>
+    <a:masterClrMapping/>
+  </p:clrMapOvr>
+</p:notes>
+</file>
+
+<file path=ppt/notesSlides/notesSlide18.xml><?xml version="1.0" encoding="utf-8"?>
+<p:notes xmlns:a="http://schemas.openxmlformats.org/drawingml/2006/main" xmlns:r="http://schemas.openxmlformats.org/officeDocument/2006/relationships" xmlns:p="http://schemas.openxmlformats.org/presentationml/2006/main">
+  <p:cSld>
+    <p:spTree>
+      <p:nvGrpSpPr>
+        <p:cNvPr id="1" name=""/>
+        <p:cNvGrpSpPr/>
+        <p:nvPr/>
+      </p:nvGrpSpPr>
+      <p:grpSpPr>
+        <a:xfrm>
+          <a:off x="0" y="0"/>
+          <a:ext cx="0" cy="0"/>
+          <a:chOff x="0" y="0"/>
+          <a:chExt cx="0" cy="0"/>
+        </a:xfrm>
+      </p:grpSpPr>
+      <p:sp>
+        <p:nvSpPr>
+          <p:cNvPr id="2" name="슬라이드 이미지 개체 틀 1"/>
+          <p:cNvSpPr>
+            <a:spLocks noGrp="1" noRot="1" noChangeAspect="1"/>
+          </p:cNvSpPr>
+          <p:nvPr>
+            <p:ph type="sldImg"/>
+          </p:nvPr>
+        </p:nvSpPr>
+        <p:spPr/>
+      </p:sp>
+      <p:sp>
+        <p:nvSpPr>
+          <p:cNvPr id="3" name="슬라이드 노트 개체 틀 2"/>
+          <p:cNvSpPr>
+            <a:spLocks noGrp="1"/>
+          </p:cNvSpPr>
+          <p:nvPr>
+            <p:ph type="body" idx="1"/>
+          </p:nvPr>
+        </p:nvSpPr>
+        <p:spPr/>
+        <p:txBody>
+          <a:bodyPr/>
+          <a:lstStyle/>
+          <a:p>
+            <a:endParaRPr lang="ko-KR" altLang="en-US" dirty="0"/>
+          </a:p>
+        </p:txBody>
+      </p:sp>
+      <p:sp>
+        <p:nvSpPr>
+          <p:cNvPr id="4" name="슬라이드 번호 개체 틀 3"/>
+          <p:cNvSpPr>
+            <a:spLocks noGrp="1"/>
+          </p:cNvSpPr>
+          <p:nvPr>
+            <p:ph type="sldNum" sz="quarter" idx="10"/>
+          </p:nvPr>
+        </p:nvSpPr>
+        <p:spPr/>
+        <p:txBody>
+          <a:bodyPr/>
+          <a:lstStyle/>
+          <a:p>
+            <a:fld id="{F9FBCD24-FD72-452C-8969-09628A5F2BDD}" type="slidenum">
+              <a:rPr lang="ko-KR" altLang="en-US" smtClean="0"/>
+              <a:t>18</a:t>
+            </a:fld>
+            <a:endParaRPr lang="ko-KR" altLang="en-US"/>
+          </a:p>
+        </p:txBody>
+      </p:sp>
+    </p:spTree>
+    <p:extLst>
+      <p:ext uri="{BB962C8B-B14F-4D97-AF65-F5344CB8AC3E}">
+        <p14:creationId xmlns:p14="http://schemas.microsoft.com/office/powerpoint/2010/main" val="366670249"/>
+      </p:ext>
+    </p:extLst>
+  </p:cSld>
+  <p:clrMapOvr>
+    <a:masterClrMapping/>
+  </p:clrMapOvr>
+</p:notes>
+</file>
+
 <file path=ppt/notesSlides/notesSlide2.xml><?xml version="1.0" encoding="utf-8"?>
 <p:notes xmlns:a="http://schemas.openxmlformats.org/drawingml/2006/main" xmlns:r="http://schemas.openxmlformats.org/officeDocument/2006/relationships" xmlns:p="http://schemas.openxmlformats.org/presentationml/2006/main">
   <p:cSld>
@@ -1205,6 +1972,174 @@
             <a:fld id="{F9FBCD24-FD72-452C-8969-09628A5F2BDD}" type="slidenum">
               <a:rPr lang="ko-KR" altLang="en-US" smtClean="0"/>
               <a:t>7</a:t>
+            </a:fld>
+            <a:endParaRPr lang="ko-KR" altLang="en-US"/>
+          </a:p>
+        </p:txBody>
+      </p:sp>
+    </p:spTree>
+    <p:extLst>
+      <p:ext uri="{BB962C8B-B14F-4D97-AF65-F5344CB8AC3E}">
+        <p14:creationId xmlns:p14="http://schemas.microsoft.com/office/powerpoint/2010/main" val="366670249"/>
+      </p:ext>
+    </p:extLst>
+  </p:cSld>
+  <p:clrMapOvr>
+    <a:masterClrMapping/>
+  </p:clrMapOvr>
+</p:notes>
+</file>
+
+<file path=ppt/notesSlides/notesSlide8.xml><?xml version="1.0" encoding="utf-8"?>
+<p:notes xmlns:a="http://schemas.openxmlformats.org/drawingml/2006/main" xmlns:r="http://schemas.openxmlformats.org/officeDocument/2006/relationships" xmlns:p="http://schemas.openxmlformats.org/presentationml/2006/main">
+  <p:cSld>
+    <p:spTree>
+      <p:nvGrpSpPr>
+        <p:cNvPr id="1" name=""/>
+        <p:cNvGrpSpPr/>
+        <p:nvPr/>
+      </p:nvGrpSpPr>
+      <p:grpSpPr>
+        <a:xfrm>
+          <a:off x="0" y="0"/>
+          <a:ext cx="0" cy="0"/>
+          <a:chOff x="0" y="0"/>
+          <a:chExt cx="0" cy="0"/>
+        </a:xfrm>
+      </p:grpSpPr>
+      <p:sp>
+        <p:nvSpPr>
+          <p:cNvPr id="2" name="슬라이드 이미지 개체 틀 1"/>
+          <p:cNvSpPr>
+            <a:spLocks noGrp="1" noRot="1" noChangeAspect="1"/>
+          </p:cNvSpPr>
+          <p:nvPr>
+            <p:ph type="sldImg"/>
+          </p:nvPr>
+        </p:nvSpPr>
+        <p:spPr/>
+      </p:sp>
+      <p:sp>
+        <p:nvSpPr>
+          <p:cNvPr id="3" name="슬라이드 노트 개체 틀 2"/>
+          <p:cNvSpPr>
+            <a:spLocks noGrp="1"/>
+          </p:cNvSpPr>
+          <p:nvPr>
+            <p:ph type="body" idx="1"/>
+          </p:nvPr>
+        </p:nvSpPr>
+        <p:spPr/>
+        <p:txBody>
+          <a:bodyPr/>
+          <a:lstStyle/>
+          <a:p>
+            <a:endParaRPr lang="ko-KR" altLang="en-US" dirty="0"/>
+          </a:p>
+        </p:txBody>
+      </p:sp>
+      <p:sp>
+        <p:nvSpPr>
+          <p:cNvPr id="4" name="슬라이드 번호 개체 틀 3"/>
+          <p:cNvSpPr>
+            <a:spLocks noGrp="1"/>
+          </p:cNvSpPr>
+          <p:nvPr>
+            <p:ph type="sldNum" sz="quarter" idx="10"/>
+          </p:nvPr>
+        </p:nvSpPr>
+        <p:spPr/>
+        <p:txBody>
+          <a:bodyPr/>
+          <a:lstStyle/>
+          <a:p>
+            <a:fld id="{F9FBCD24-FD72-452C-8969-09628A5F2BDD}" type="slidenum">
+              <a:rPr lang="ko-KR" altLang="en-US" smtClean="0"/>
+              <a:t>8</a:t>
+            </a:fld>
+            <a:endParaRPr lang="ko-KR" altLang="en-US"/>
+          </a:p>
+        </p:txBody>
+      </p:sp>
+    </p:spTree>
+    <p:extLst>
+      <p:ext uri="{BB962C8B-B14F-4D97-AF65-F5344CB8AC3E}">
+        <p14:creationId xmlns:p14="http://schemas.microsoft.com/office/powerpoint/2010/main" val="366670249"/>
+      </p:ext>
+    </p:extLst>
+  </p:cSld>
+  <p:clrMapOvr>
+    <a:masterClrMapping/>
+  </p:clrMapOvr>
+</p:notes>
+</file>
+
+<file path=ppt/notesSlides/notesSlide9.xml><?xml version="1.0" encoding="utf-8"?>
+<p:notes xmlns:a="http://schemas.openxmlformats.org/drawingml/2006/main" xmlns:r="http://schemas.openxmlformats.org/officeDocument/2006/relationships" xmlns:p="http://schemas.openxmlformats.org/presentationml/2006/main">
+  <p:cSld>
+    <p:spTree>
+      <p:nvGrpSpPr>
+        <p:cNvPr id="1" name=""/>
+        <p:cNvGrpSpPr/>
+        <p:nvPr/>
+      </p:nvGrpSpPr>
+      <p:grpSpPr>
+        <a:xfrm>
+          <a:off x="0" y="0"/>
+          <a:ext cx="0" cy="0"/>
+          <a:chOff x="0" y="0"/>
+          <a:chExt cx="0" cy="0"/>
+        </a:xfrm>
+      </p:grpSpPr>
+      <p:sp>
+        <p:nvSpPr>
+          <p:cNvPr id="2" name="슬라이드 이미지 개체 틀 1"/>
+          <p:cNvSpPr>
+            <a:spLocks noGrp="1" noRot="1" noChangeAspect="1"/>
+          </p:cNvSpPr>
+          <p:nvPr>
+            <p:ph type="sldImg"/>
+          </p:nvPr>
+        </p:nvSpPr>
+        <p:spPr/>
+      </p:sp>
+      <p:sp>
+        <p:nvSpPr>
+          <p:cNvPr id="3" name="슬라이드 노트 개체 틀 2"/>
+          <p:cNvSpPr>
+            <a:spLocks noGrp="1"/>
+          </p:cNvSpPr>
+          <p:nvPr>
+            <p:ph type="body" idx="1"/>
+          </p:nvPr>
+        </p:nvSpPr>
+        <p:spPr/>
+        <p:txBody>
+          <a:bodyPr/>
+          <a:lstStyle/>
+          <a:p>
+            <a:endParaRPr lang="ko-KR" altLang="en-US" dirty="0"/>
+          </a:p>
+        </p:txBody>
+      </p:sp>
+      <p:sp>
+        <p:nvSpPr>
+          <p:cNvPr id="4" name="슬라이드 번호 개체 틀 3"/>
+          <p:cNvSpPr>
+            <a:spLocks noGrp="1"/>
+          </p:cNvSpPr>
+          <p:nvPr>
+            <p:ph type="sldNum" sz="quarter" idx="10"/>
+          </p:nvPr>
+        </p:nvSpPr>
+        <p:spPr/>
+        <p:txBody>
+          <a:bodyPr/>
+          <a:lstStyle/>
+          <a:p>
+            <a:fld id="{F9FBCD24-FD72-452C-8969-09628A5F2BDD}" type="slidenum">
+              <a:rPr lang="ko-KR" altLang="en-US" smtClean="0"/>
+              <a:t>9</a:t>
             </a:fld>
             <a:endParaRPr lang="ko-KR" altLang="en-US"/>
           </a:p>
@@ -4548,6 +5483,1590 @@
 </p:sld>
 </file>
 
+<file path=ppt/slides/slide10.xml><?xml version="1.0" encoding="utf-8"?>
+<p:sld xmlns:a="http://schemas.openxmlformats.org/drawingml/2006/main" xmlns:r="http://schemas.openxmlformats.org/officeDocument/2006/relationships" xmlns:p="http://schemas.openxmlformats.org/presentationml/2006/main">
+  <p:cSld>
+    <p:spTree>
+      <p:nvGrpSpPr>
+        <p:cNvPr id="1" name=""/>
+        <p:cNvGrpSpPr/>
+        <p:nvPr/>
+      </p:nvGrpSpPr>
+      <p:grpSpPr>
+        <a:xfrm>
+          <a:off x="0" y="0"/>
+          <a:ext cx="0" cy="0"/>
+          <a:chOff x="0" y="0"/>
+          <a:chExt cx="0" cy="0"/>
+        </a:xfrm>
+      </p:grpSpPr>
+      <p:sp>
+        <p:nvSpPr>
+          <p:cNvPr id="2" name="제목 1"/>
+          <p:cNvSpPr>
+            <a:spLocks noGrp="1"/>
+          </p:cNvSpPr>
+          <p:nvPr>
+            <p:ph type="title"/>
+          </p:nvPr>
+        </p:nvSpPr>
+        <p:spPr>
+          <a:xfrm>
+            <a:off x="252000" y="298748"/>
+            <a:ext cx="8640000" cy="338554"/>
+          </a:xfrm>
+        </p:spPr>
+        <p:txBody>
+          <a:bodyPr/>
+          <a:lstStyle/>
+          <a:p>
+            <a:pPr>
+              <a:defRPr/>
+            </a:pPr>
+            <a:r>
+              <a:rPr lang="en-US" altLang="ko-KR" dirty="0" smtClean="0"/>
+              <a:t>2. Elastic Search – score</a:t>
+            </a:r>
+            <a:endParaRPr lang="ko-KR" altLang="en-US" dirty="0"/>
+          </a:p>
+        </p:txBody>
+      </p:sp>
+      <p:sp>
+        <p:nvSpPr>
+          <p:cNvPr id="4" name="내용 개체 틀 3"/>
+          <p:cNvSpPr>
+            <a:spLocks noGrp="1"/>
+          </p:cNvSpPr>
+          <p:nvPr>
+            <p:ph idx="1"/>
+          </p:nvPr>
+        </p:nvSpPr>
+        <p:spPr>
+          <a:xfrm>
+            <a:off x="179512" y="1124744"/>
+            <a:ext cx="7920000" cy="4525963"/>
+          </a:xfrm>
+        </p:spPr>
+        <p:txBody>
+          <a:bodyPr/>
+          <a:lstStyle/>
+          <a:p>
+            <a:r>
+              <a:rPr lang="en-US" altLang="ko-KR" dirty="0">
+                <a:hlinkClick r:id="rId3"/>
+              </a:rPr>
+              <a:t>http://10.110.243.90:9200/seunjeon-idx/_</a:t>
+            </a:r>
+            <a:r>
+              <a:rPr lang="en-US" altLang="ko-KR" dirty="0" smtClean="0">
+                <a:hlinkClick r:id="rId3"/>
+              </a:rPr>
+              <a:t>search?q=title:</a:t>
+            </a:r>
+            <a:r>
+              <a:rPr lang="ko-KR" altLang="en-US" dirty="0" smtClean="0">
+                <a:hlinkClick r:id="rId3"/>
+              </a:rPr>
+              <a:t>테스트</a:t>
+            </a:r>
+            <a:r>
+              <a:rPr lang="en-US" altLang="ko-KR" dirty="0" smtClean="0">
+                <a:hlinkClick r:id="rId3"/>
+              </a:rPr>
+              <a:t>%20</a:t>
+            </a:r>
+            <a:r>
+              <a:rPr lang="ko-KR" altLang="en-US" dirty="0" err="1" smtClean="0">
+                <a:hlinkClick r:id="rId3"/>
+              </a:rPr>
+              <a:t>정보글</a:t>
+            </a:r>
+            <a:r>
+              <a:rPr lang="en-US" altLang="ko-KR" dirty="0" smtClean="0">
+                <a:hlinkClick r:id="rId3"/>
+              </a:rPr>
+              <a:t>&amp;pretty=true</a:t>
+            </a:r>
+            <a:endParaRPr lang="ko-KR" altLang="en-US" dirty="0"/>
+          </a:p>
+        </p:txBody>
+      </p:sp>
+      <p:sp>
+        <p:nvSpPr>
+          <p:cNvPr id="14" name="내용 개체 틀 3"/>
+          <p:cNvSpPr txBox="1">
+            <a:spLocks/>
+          </p:cNvSpPr>
+          <p:nvPr/>
+        </p:nvSpPr>
+        <p:spPr>
+          <a:xfrm>
+            <a:off x="6012160" y="1484784"/>
+            <a:ext cx="3960000" cy="4525963"/>
+          </a:xfrm>
+          <a:prstGeom prst="rect">
+            <a:avLst/>
+          </a:prstGeom>
+        </p:spPr>
+        <p:txBody>
+          <a:bodyPr/>
+          <a:lstStyle>
+            <a:lvl1pPr marL="0" indent="0" algn="l" defTabSz="180000" rtl="0" eaLnBrk="1" latinLnBrk="1" hangingPunct="1">
+              <a:lnSpc>
+                <a:spcPct val="150000"/>
+              </a:lnSpc>
+              <a:spcBef>
+                <a:spcPts val="300"/>
+              </a:spcBef>
+              <a:buFontTx/>
+              <a:buNone/>
+              <a:tabLst>
+                <a:tab pos="180000" algn="l"/>
+              </a:tabLst>
+              <a:defRPr lang="ko-KR" altLang="en-US" sz="1000" b="0" i="0" kern="1200" spc="0" baseline="0" smtClean="0">
+                <a:solidFill>
+                  <a:schemeClr val="tx1"/>
+                </a:solidFill>
+                <a:latin typeface="+mn-lt"/>
+                <a:ea typeface="+mn-ea"/>
+                <a:cs typeface="+mn-cs"/>
+              </a:defRPr>
+            </a:lvl1pPr>
+            <a:lvl2pPr marL="180000" indent="-180000" algn="l" defTabSz="914400" rtl="0" eaLnBrk="1" latinLnBrk="1" hangingPunct="1">
+              <a:lnSpc>
+                <a:spcPct val="150000"/>
+              </a:lnSpc>
+              <a:spcBef>
+                <a:spcPts val="10"/>
+              </a:spcBef>
+              <a:buFont typeface="+mj-lt"/>
+              <a:buAutoNum type="arabicPeriod"/>
+              <a:defRPr sz="1000" b="0" i="0" kern="1200" spc="0">
+                <a:solidFill>
+                  <a:schemeClr val="tx1"/>
+                </a:solidFill>
+                <a:latin typeface="+mn-lt"/>
+                <a:ea typeface="+mn-ea"/>
+                <a:cs typeface="+mn-cs"/>
+              </a:defRPr>
+            </a:lvl2pPr>
+            <a:lvl3pPr marL="360000" indent="-180000" algn="l" defTabSz="914400" rtl="0" eaLnBrk="1" latinLnBrk="1" hangingPunct="1">
+              <a:lnSpc>
+                <a:spcPct val="150000"/>
+              </a:lnSpc>
+              <a:spcBef>
+                <a:spcPts val="10"/>
+              </a:spcBef>
+              <a:buFont typeface="+mj-lt"/>
+              <a:buAutoNum type="arabicParenR"/>
+              <a:defRPr sz="1000" kern="1200">
+                <a:solidFill>
+                  <a:schemeClr val="tx1"/>
+                </a:solidFill>
+                <a:latin typeface="+mn-lt"/>
+                <a:ea typeface="+mn-ea"/>
+                <a:cs typeface="+mn-cs"/>
+              </a:defRPr>
+            </a:lvl3pPr>
+            <a:lvl4pPr marL="648000" indent="-180000" algn="l" defTabSz="914400" rtl="0" eaLnBrk="1" latinLnBrk="1" hangingPunct="1">
+              <a:lnSpc>
+                <a:spcPct val="150000"/>
+              </a:lnSpc>
+              <a:spcBef>
+                <a:spcPts val="10"/>
+              </a:spcBef>
+              <a:buFont typeface="+mj-ea"/>
+              <a:buAutoNum type="circleNumDbPlain"/>
+              <a:defRPr sz="1000" b="0" i="0" kern="1200" spc="0">
+                <a:solidFill>
+                  <a:schemeClr val="tx1"/>
+                </a:solidFill>
+                <a:latin typeface="+mn-lt"/>
+                <a:ea typeface="+mn-ea"/>
+                <a:cs typeface="+mn-cs"/>
+              </a:defRPr>
+            </a:lvl4pPr>
+            <a:lvl5pPr marL="648000" indent="108000" algn="l" defTabSz="914400" rtl="0" eaLnBrk="1" latinLnBrk="1" hangingPunct="1">
+              <a:lnSpc>
+                <a:spcPct val="150000"/>
+              </a:lnSpc>
+              <a:spcBef>
+                <a:spcPts val="100"/>
+              </a:spcBef>
+              <a:buFont typeface="Arial" panose="020B0604020202020204" pitchFamily="34" charset="0"/>
+              <a:buChar char="•"/>
+              <a:defRPr sz="1000" kern="1200">
+                <a:solidFill>
+                  <a:schemeClr val="tx1"/>
+                </a:solidFill>
+                <a:latin typeface="+mn-lt"/>
+                <a:ea typeface="+mn-ea"/>
+                <a:cs typeface="+mn-cs"/>
+              </a:defRPr>
+            </a:lvl5pPr>
+            <a:lvl6pPr marL="900000" indent="0" algn="l" defTabSz="914400" rtl="0" eaLnBrk="1" latinLnBrk="1" hangingPunct="1">
+              <a:lnSpc>
+                <a:spcPct val="150000"/>
+              </a:lnSpc>
+              <a:spcBef>
+                <a:spcPts val="10"/>
+              </a:spcBef>
+              <a:buFontTx/>
+              <a:buNone/>
+              <a:defRPr sz="1000" kern="1200">
+                <a:solidFill>
+                  <a:schemeClr val="tx1"/>
+                </a:solidFill>
+                <a:latin typeface="+mn-lt"/>
+                <a:ea typeface="+mn-ea"/>
+                <a:cs typeface="+mn-cs"/>
+              </a:defRPr>
+            </a:lvl6pPr>
+            <a:lvl7pPr marL="2971800" indent="-228600" algn="l" defTabSz="914400" rtl="0" eaLnBrk="1" latinLnBrk="1" hangingPunct="1">
+              <a:spcBef>
+                <a:spcPct val="20000"/>
+              </a:spcBef>
+              <a:buFont typeface="Arial" panose="020B0604020202020204" pitchFamily="34" charset="0"/>
+              <a:buChar char="•"/>
+              <a:defRPr sz="2000" kern="1200">
+                <a:solidFill>
+                  <a:schemeClr val="tx1"/>
+                </a:solidFill>
+                <a:latin typeface="+mn-lt"/>
+                <a:ea typeface="+mn-ea"/>
+                <a:cs typeface="+mn-cs"/>
+              </a:defRPr>
+            </a:lvl7pPr>
+            <a:lvl8pPr marL="3429000" indent="-228600" algn="l" defTabSz="914400" rtl="0" eaLnBrk="1" latinLnBrk="1" hangingPunct="1">
+              <a:spcBef>
+                <a:spcPct val="20000"/>
+              </a:spcBef>
+              <a:buFont typeface="Arial" panose="020B0604020202020204" pitchFamily="34" charset="0"/>
+              <a:buChar char="•"/>
+              <a:defRPr sz="2000" kern="1200">
+                <a:solidFill>
+                  <a:schemeClr val="tx1"/>
+                </a:solidFill>
+                <a:latin typeface="+mn-lt"/>
+                <a:ea typeface="+mn-ea"/>
+                <a:cs typeface="+mn-cs"/>
+              </a:defRPr>
+            </a:lvl8pPr>
+            <a:lvl9pPr marL="3886200" indent="-228600" algn="l" defTabSz="914400" rtl="0" eaLnBrk="1" latinLnBrk="1" hangingPunct="1">
+              <a:spcBef>
+                <a:spcPct val="20000"/>
+              </a:spcBef>
+              <a:buFont typeface="Arial" panose="020B0604020202020204" pitchFamily="34" charset="0"/>
+              <a:buChar char="•"/>
+              <a:defRPr sz="2000" kern="1200">
+                <a:solidFill>
+                  <a:schemeClr val="tx1"/>
+                </a:solidFill>
+                <a:latin typeface="+mn-lt"/>
+                <a:ea typeface="+mn-ea"/>
+                <a:cs typeface="+mn-cs"/>
+              </a:defRPr>
+            </a:lvl9pPr>
+          </a:lstStyle>
+          <a:p>
+            <a:pPr marL="171450" indent="-171450">
+              <a:buFont typeface="Arial" panose="020B0604020202020204" pitchFamily="34" charset="0"/>
+              <a:buChar char="•"/>
+            </a:pPr>
+            <a:r>
+              <a:rPr lang="ko-KR" altLang="en-US" dirty="0" err="1" smtClean="0"/>
+              <a:t>문서안의</a:t>
+            </a:r>
+            <a:r>
+              <a:rPr lang="ko-KR" altLang="en-US" dirty="0" smtClean="0"/>
+              <a:t> 단어의 빈도에 따라 </a:t>
+            </a:r>
+            <a:r>
+              <a:rPr lang="en-US" altLang="ko-KR" dirty="0" smtClean="0"/>
+              <a:t>score</a:t>
+            </a:r>
+            <a:r>
+              <a:rPr lang="ko-KR" altLang="en-US" dirty="0" smtClean="0"/>
+              <a:t>를 결정</a:t>
+            </a:r>
+            <a:endParaRPr lang="en-US" dirty="0"/>
+          </a:p>
+        </p:txBody>
+      </p:sp>
+      <p:pic>
+        <p:nvPicPr>
+          <p:cNvPr id="1026" name="Picture 2" descr="C:\Users\Naver.AL00039501\Desktop\맨밑.png"/>
+          <p:cNvPicPr>
+            <a:picLocks noChangeAspect="1" noChangeArrowheads="1"/>
+          </p:cNvPicPr>
+          <p:nvPr/>
+        </p:nvPicPr>
+        <p:blipFill>
+          <a:blip r:embed="rId4">
+            <a:extLst>
+              <a:ext uri="{28A0092B-C50C-407E-A947-70E740481C1C}">
+                <a14:useLocalDpi xmlns:a14="http://schemas.microsoft.com/office/drawing/2010/main" val="0"/>
+              </a:ext>
+            </a:extLst>
+          </a:blip>
+          <a:srcRect/>
+          <a:stretch>
+            <a:fillRect/>
+          </a:stretch>
+        </p:blipFill>
+        <p:spPr bwMode="auto">
+          <a:xfrm>
+            <a:off x="612269" y="3818309"/>
+            <a:ext cx="2794960" cy="2671288"/>
+          </a:xfrm>
+          <a:prstGeom prst="rect">
+            <a:avLst/>
+          </a:prstGeom>
+          <a:noFill/>
+          <a:extLst>
+            <a:ext uri="{909E8E84-426E-40DD-AFC4-6F175D3DCCD1}">
+              <a14:hiddenFill xmlns:a14="http://schemas.microsoft.com/office/drawing/2010/main">
+                <a:solidFill>
+                  <a:srgbClr val="FFFFFF"/>
+                </a:solidFill>
+              </a14:hiddenFill>
+            </a:ext>
+          </a:extLst>
+        </p:spPr>
+      </p:pic>
+      <p:pic>
+        <p:nvPicPr>
+          <p:cNvPr id="1027" name="Picture 3" descr="C:\Users\Naver.AL00039501\Desktop\맨위.png"/>
+          <p:cNvPicPr>
+            <a:picLocks noChangeAspect="1" noChangeArrowheads="1"/>
+          </p:cNvPicPr>
+          <p:nvPr/>
+        </p:nvPicPr>
+        <p:blipFill>
+          <a:blip r:embed="rId5">
+            <a:extLst>
+              <a:ext uri="{28A0092B-C50C-407E-A947-70E740481C1C}">
+                <a14:useLocalDpi xmlns:a14="http://schemas.microsoft.com/office/drawing/2010/main" val="0"/>
+              </a:ext>
+            </a:extLst>
+          </a:blip>
+          <a:srcRect/>
+          <a:stretch>
+            <a:fillRect/>
+          </a:stretch>
+        </p:blipFill>
+        <p:spPr bwMode="auto">
+          <a:xfrm>
+            <a:off x="647665" y="1697104"/>
+            <a:ext cx="3276263" cy="2146052"/>
+          </a:xfrm>
+          <a:prstGeom prst="rect">
+            <a:avLst/>
+          </a:prstGeom>
+          <a:noFill/>
+          <a:extLst>
+            <a:ext uri="{909E8E84-426E-40DD-AFC4-6F175D3DCCD1}">
+              <a14:hiddenFill xmlns:a14="http://schemas.microsoft.com/office/drawing/2010/main">
+                <a:solidFill>
+                  <a:srgbClr val="FFFFFF"/>
+                </a:solidFill>
+              </a14:hiddenFill>
+            </a:ext>
+          </a:extLst>
+        </p:spPr>
+      </p:pic>
+    </p:spTree>
+    <p:extLst>
+      <p:ext uri="{BB962C8B-B14F-4D97-AF65-F5344CB8AC3E}">
+        <p14:creationId xmlns:p14="http://schemas.microsoft.com/office/powerpoint/2010/main" val="3012306094"/>
+      </p:ext>
+    </p:extLst>
+  </p:cSld>
+  <p:clrMapOvr>
+    <a:masterClrMapping/>
+  </p:clrMapOvr>
+  <p:timing>
+    <p:tnLst>
+      <p:par>
+        <p:cTn id="1" dur="indefinite" restart="never" nodeType="tmRoot"/>
+      </p:par>
+    </p:tnLst>
+  </p:timing>
+</p:sld>
+</file>
+
+<file path=ppt/slides/slide11.xml><?xml version="1.0" encoding="utf-8"?>
+<p:sld xmlns:a="http://schemas.openxmlformats.org/drawingml/2006/main" xmlns:r="http://schemas.openxmlformats.org/officeDocument/2006/relationships" xmlns:p="http://schemas.openxmlformats.org/presentationml/2006/main">
+  <p:cSld>
+    <p:spTree>
+      <p:nvGrpSpPr>
+        <p:cNvPr id="1" name=""/>
+        <p:cNvGrpSpPr/>
+        <p:nvPr/>
+      </p:nvGrpSpPr>
+      <p:grpSpPr>
+        <a:xfrm>
+          <a:off x="0" y="0"/>
+          <a:ext cx="0" cy="0"/>
+          <a:chOff x="0" y="0"/>
+          <a:chExt cx="0" cy="0"/>
+        </a:xfrm>
+      </p:grpSpPr>
+      <p:sp>
+        <p:nvSpPr>
+          <p:cNvPr id="2" name="제목 1"/>
+          <p:cNvSpPr>
+            <a:spLocks noGrp="1"/>
+          </p:cNvSpPr>
+          <p:nvPr>
+            <p:ph type="title"/>
+          </p:nvPr>
+        </p:nvSpPr>
+        <p:spPr>
+          <a:xfrm>
+            <a:off x="252000" y="298748"/>
+            <a:ext cx="8640000" cy="338554"/>
+          </a:xfrm>
+        </p:spPr>
+        <p:txBody>
+          <a:bodyPr/>
+          <a:lstStyle/>
+          <a:p>
+            <a:pPr>
+              <a:defRPr/>
+            </a:pPr>
+            <a:r>
+              <a:rPr lang="en-US" altLang="ko-KR" dirty="0" smtClean="0"/>
+              <a:t>3. </a:t>
+            </a:r>
+            <a:r>
+              <a:rPr lang="ko-KR" altLang="en-US" dirty="0" smtClean="0"/>
+              <a:t>현재의</a:t>
+            </a:r>
+            <a:r>
+              <a:rPr lang="en-US" altLang="ko-KR" dirty="0" smtClean="0"/>
+              <a:t> Search Engine</a:t>
+            </a:r>
+            <a:endParaRPr lang="ko-KR" altLang="en-US" dirty="0"/>
+          </a:p>
+        </p:txBody>
+      </p:sp>
+      <p:sp>
+        <p:nvSpPr>
+          <p:cNvPr id="5" name="TextBox 4"/>
+          <p:cNvSpPr txBox="1"/>
+          <p:nvPr/>
+        </p:nvSpPr>
+        <p:spPr>
+          <a:xfrm>
+            <a:off x="395536" y="1052736"/>
+            <a:ext cx="5184576" cy="369332"/>
+          </a:xfrm>
+          <a:prstGeom prst="rect">
+            <a:avLst/>
+          </a:prstGeom>
+          <a:noFill/>
+        </p:spPr>
+        <p:txBody>
+          <a:bodyPr wrap="square" rtlCol="0">
+            <a:spAutoFit/>
+          </a:bodyPr>
+          <a:lstStyle/>
+          <a:p>
+            <a:pPr marL="285750" indent="-285750">
+              <a:buFont typeface="Arial" panose="020B0604020202020204" pitchFamily="34" charset="0"/>
+              <a:buChar char="•"/>
+            </a:pPr>
+            <a:r>
+              <a:rPr lang="en-US" altLang="ko-KR" dirty="0" smtClean="0"/>
+              <a:t>Deep Convolution Neural Network, </a:t>
+            </a:r>
+            <a:r>
+              <a:rPr lang="en-US" altLang="ko-KR" dirty="0" err="1" smtClean="0"/>
+              <a:t>ImageNet</a:t>
+            </a:r>
+            <a:endParaRPr lang="ko-KR" altLang="en-US" dirty="0"/>
+          </a:p>
+        </p:txBody>
+      </p:sp>
+      <p:pic>
+        <p:nvPicPr>
+          <p:cNvPr id="4098" name="Picture 2" descr="C:\Users\Naver.AL00039501\Desktop\이미지넷.png"/>
+          <p:cNvPicPr>
+            <a:picLocks noChangeAspect="1" noChangeArrowheads="1"/>
+          </p:cNvPicPr>
+          <p:nvPr/>
+        </p:nvPicPr>
+        <p:blipFill>
+          <a:blip r:embed="rId3">
+            <a:extLst>
+              <a:ext uri="{28A0092B-C50C-407E-A947-70E740481C1C}">
+                <a14:useLocalDpi xmlns:a14="http://schemas.microsoft.com/office/drawing/2010/main" val="0"/>
+              </a:ext>
+            </a:extLst>
+          </a:blip>
+          <a:srcRect/>
+          <a:stretch>
+            <a:fillRect/>
+          </a:stretch>
+        </p:blipFill>
+        <p:spPr bwMode="auto">
+          <a:xfrm>
+            <a:off x="0" y="1708508"/>
+            <a:ext cx="9163050" cy="5133975"/>
+          </a:xfrm>
+          <a:prstGeom prst="rect">
+            <a:avLst/>
+          </a:prstGeom>
+          <a:noFill/>
+          <a:extLst>
+            <a:ext uri="{909E8E84-426E-40DD-AFC4-6F175D3DCCD1}">
+              <a14:hiddenFill xmlns:a14="http://schemas.microsoft.com/office/drawing/2010/main">
+                <a:solidFill>
+                  <a:srgbClr val="FFFFFF"/>
+                </a:solidFill>
+              </a14:hiddenFill>
+            </a:ext>
+          </a:extLst>
+        </p:spPr>
+      </p:pic>
+    </p:spTree>
+    <p:extLst>
+      <p:ext uri="{BB962C8B-B14F-4D97-AF65-F5344CB8AC3E}">
+        <p14:creationId xmlns:p14="http://schemas.microsoft.com/office/powerpoint/2010/main" val="2873275685"/>
+      </p:ext>
+    </p:extLst>
+  </p:cSld>
+  <p:clrMapOvr>
+    <a:masterClrMapping/>
+  </p:clrMapOvr>
+  <p:timing>
+    <p:tnLst>
+      <p:par>
+        <p:cTn id="1" dur="indefinite" restart="never" nodeType="tmRoot"/>
+      </p:par>
+    </p:tnLst>
+  </p:timing>
+</p:sld>
+</file>
+
+<file path=ppt/slides/slide12.xml><?xml version="1.0" encoding="utf-8"?>
+<p:sld xmlns:a="http://schemas.openxmlformats.org/drawingml/2006/main" xmlns:r="http://schemas.openxmlformats.org/officeDocument/2006/relationships" xmlns:p="http://schemas.openxmlformats.org/presentationml/2006/main">
+  <p:cSld>
+    <p:spTree>
+      <p:nvGrpSpPr>
+        <p:cNvPr id="1" name=""/>
+        <p:cNvGrpSpPr/>
+        <p:nvPr/>
+      </p:nvGrpSpPr>
+      <p:grpSpPr>
+        <a:xfrm>
+          <a:off x="0" y="0"/>
+          <a:ext cx="0" cy="0"/>
+          <a:chOff x="0" y="0"/>
+          <a:chExt cx="0" cy="0"/>
+        </a:xfrm>
+      </p:grpSpPr>
+      <p:sp>
+        <p:nvSpPr>
+          <p:cNvPr id="2" name="제목 1"/>
+          <p:cNvSpPr>
+            <a:spLocks noGrp="1"/>
+          </p:cNvSpPr>
+          <p:nvPr>
+            <p:ph type="title"/>
+          </p:nvPr>
+        </p:nvSpPr>
+        <p:spPr>
+          <a:xfrm>
+            <a:off x="252000" y="298748"/>
+            <a:ext cx="8640000" cy="338554"/>
+          </a:xfrm>
+        </p:spPr>
+        <p:txBody>
+          <a:bodyPr/>
+          <a:lstStyle/>
+          <a:p>
+            <a:pPr>
+              <a:defRPr/>
+            </a:pPr>
+            <a:r>
+              <a:rPr lang="en-US" altLang="ko-KR" dirty="0" smtClean="0"/>
+              <a:t>3. </a:t>
+            </a:r>
+            <a:r>
+              <a:rPr lang="ko-KR" altLang="en-US" dirty="0" smtClean="0"/>
+              <a:t>현재의</a:t>
+            </a:r>
+            <a:r>
+              <a:rPr lang="en-US" altLang="ko-KR" dirty="0" smtClean="0"/>
+              <a:t> Search Engine</a:t>
+            </a:r>
+            <a:endParaRPr lang="ko-KR" altLang="en-US" dirty="0"/>
+          </a:p>
+        </p:txBody>
+      </p:sp>
+      <p:sp>
+        <p:nvSpPr>
+          <p:cNvPr id="5" name="TextBox 4"/>
+          <p:cNvSpPr txBox="1"/>
+          <p:nvPr/>
+        </p:nvSpPr>
+        <p:spPr>
+          <a:xfrm>
+            <a:off x="395536" y="1052736"/>
+            <a:ext cx="5184576" cy="369332"/>
+          </a:xfrm>
+          <a:prstGeom prst="rect">
+            <a:avLst/>
+          </a:prstGeom>
+          <a:noFill/>
+        </p:spPr>
+        <p:txBody>
+          <a:bodyPr wrap="square" rtlCol="0">
+            <a:spAutoFit/>
+          </a:bodyPr>
+          <a:lstStyle/>
+          <a:p>
+            <a:pPr marL="285750" indent="-285750">
+              <a:buFont typeface="Arial" panose="020B0604020202020204" pitchFamily="34" charset="0"/>
+              <a:buChar char="•"/>
+            </a:pPr>
+            <a:r>
+              <a:rPr lang="en-US" altLang="ko-KR" dirty="0" smtClean="0"/>
+              <a:t>RNN, LSTM</a:t>
+            </a:r>
+            <a:endParaRPr lang="ko-KR" altLang="en-US" dirty="0"/>
+          </a:p>
+        </p:txBody>
+      </p:sp>
+      <p:pic>
+        <p:nvPicPr>
+          <p:cNvPr id="5122" name="Picture 2" descr="C:\Users\Naver.AL00039501\Desktop\deep.png"/>
+          <p:cNvPicPr>
+            <a:picLocks noChangeAspect="1" noChangeArrowheads="1"/>
+          </p:cNvPicPr>
+          <p:nvPr/>
+        </p:nvPicPr>
+        <p:blipFill>
+          <a:blip r:embed="rId3">
+            <a:extLst>
+              <a:ext uri="{28A0092B-C50C-407E-A947-70E740481C1C}">
+                <a14:useLocalDpi xmlns:a14="http://schemas.microsoft.com/office/drawing/2010/main" val="0"/>
+              </a:ext>
+            </a:extLst>
+          </a:blip>
+          <a:srcRect/>
+          <a:stretch>
+            <a:fillRect/>
+          </a:stretch>
+        </p:blipFill>
+        <p:spPr bwMode="auto">
+          <a:xfrm>
+            <a:off x="411358" y="1844824"/>
+            <a:ext cx="8352928" cy="4303602"/>
+          </a:xfrm>
+          <a:prstGeom prst="rect">
+            <a:avLst/>
+          </a:prstGeom>
+          <a:noFill/>
+          <a:extLst>
+            <a:ext uri="{909E8E84-426E-40DD-AFC4-6F175D3DCCD1}">
+              <a14:hiddenFill xmlns:a14="http://schemas.microsoft.com/office/drawing/2010/main">
+                <a:solidFill>
+                  <a:srgbClr val="FFFFFF"/>
+                </a:solidFill>
+              </a14:hiddenFill>
+            </a:ext>
+          </a:extLst>
+        </p:spPr>
+      </p:pic>
+    </p:spTree>
+    <p:extLst>
+      <p:ext uri="{BB962C8B-B14F-4D97-AF65-F5344CB8AC3E}">
+        <p14:creationId xmlns:p14="http://schemas.microsoft.com/office/powerpoint/2010/main" val="3610119966"/>
+      </p:ext>
+    </p:extLst>
+  </p:cSld>
+  <p:clrMapOvr>
+    <a:masterClrMapping/>
+  </p:clrMapOvr>
+  <p:timing>
+    <p:tnLst>
+      <p:par>
+        <p:cTn id="1" dur="indefinite" restart="never" nodeType="tmRoot"/>
+      </p:par>
+    </p:tnLst>
+  </p:timing>
+</p:sld>
+</file>
+
+<file path=ppt/slides/slide13.xml><?xml version="1.0" encoding="utf-8"?>
+<p:sld xmlns:a="http://schemas.openxmlformats.org/drawingml/2006/main" xmlns:r="http://schemas.openxmlformats.org/officeDocument/2006/relationships" xmlns:p="http://schemas.openxmlformats.org/presentationml/2006/main">
+  <p:cSld>
+    <p:spTree>
+      <p:nvGrpSpPr>
+        <p:cNvPr id="1" name=""/>
+        <p:cNvGrpSpPr/>
+        <p:nvPr/>
+      </p:nvGrpSpPr>
+      <p:grpSpPr>
+        <a:xfrm>
+          <a:off x="0" y="0"/>
+          <a:ext cx="0" cy="0"/>
+          <a:chOff x="0" y="0"/>
+          <a:chExt cx="0" cy="0"/>
+        </a:xfrm>
+      </p:grpSpPr>
+      <p:sp>
+        <p:nvSpPr>
+          <p:cNvPr id="2" name="제목 1"/>
+          <p:cNvSpPr>
+            <a:spLocks noGrp="1"/>
+          </p:cNvSpPr>
+          <p:nvPr>
+            <p:ph type="title"/>
+          </p:nvPr>
+        </p:nvSpPr>
+        <p:spPr>
+          <a:xfrm>
+            <a:off x="252000" y="298748"/>
+            <a:ext cx="8640000" cy="338554"/>
+          </a:xfrm>
+        </p:spPr>
+        <p:txBody>
+          <a:bodyPr/>
+          <a:lstStyle/>
+          <a:p>
+            <a:pPr>
+              <a:defRPr/>
+            </a:pPr>
+            <a:r>
+              <a:rPr lang="en-US" altLang="ko-KR" dirty="0" smtClean="0"/>
+              <a:t>3. </a:t>
+            </a:r>
+            <a:r>
+              <a:rPr lang="ko-KR" altLang="en-US" dirty="0" smtClean="0"/>
+              <a:t>현재의</a:t>
+            </a:r>
+            <a:r>
+              <a:rPr lang="en-US" altLang="ko-KR" dirty="0" smtClean="0"/>
+              <a:t> Search Engine</a:t>
+            </a:r>
+            <a:endParaRPr lang="ko-KR" altLang="en-US" dirty="0"/>
+          </a:p>
+        </p:txBody>
+      </p:sp>
+      <p:sp>
+        <p:nvSpPr>
+          <p:cNvPr id="5" name="TextBox 4"/>
+          <p:cNvSpPr txBox="1"/>
+          <p:nvPr/>
+        </p:nvSpPr>
+        <p:spPr>
+          <a:xfrm>
+            <a:off x="395536" y="1052736"/>
+            <a:ext cx="5184576" cy="2031325"/>
+          </a:xfrm>
+          <a:prstGeom prst="rect">
+            <a:avLst/>
+          </a:prstGeom>
+          <a:noFill/>
+        </p:spPr>
+        <p:txBody>
+          <a:bodyPr wrap="square" rtlCol="0">
+            <a:spAutoFit/>
+          </a:bodyPr>
+          <a:lstStyle/>
+          <a:p>
+            <a:pPr marL="285750" indent="-285750">
+              <a:buFont typeface="Arial" panose="020B0604020202020204" pitchFamily="34" charset="0"/>
+              <a:buChar char="•"/>
+            </a:pPr>
+            <a:r>
+              <a:rPr lang="en-US" altLang="ko-KR" dirty="0" smtClean="0"/>
+              <a:t>Real Time Summarize(SNS)</a:t>
+            </a:r>
+          </a:p>
+          <a:p>
+            <a:pPr marL="285750" indent="-285750">
+              <a:buFont typeface="Arial" panose="020B0604020202020204" pitchFamily="34" charset="0"/>
+              <a:buChar char="•"/>
+            </a:pPr>
+            <a:endParaRPr lang="en-US" altLang="ko-KR" dirty="0"/>
+          </a:p>
+          <a:p>
+            <a:pPr marL="285750" indent="-285750">
+              <a:buFont typeface="Arial" panose="020B0604020202020204" pitchFamily="34" charset="0"/>
+              <a:buChar char="•"/>
+            </a:pPr>
+            <a:r>
+              <a:rPr lang="en-US" altLang="ko-KR" dirty="0" smtClean="0"/>
+              <a:t>Live QA(</a:t>
+            </a:r>
+            <a:r>
+              <a:rPr lang="ko-KR" altLang="en-US" dirty="0" smtClean="0"/>
+              <a:t>질의 응답</a:t>
+            </a:r>
+            <a:r>
+              <a:rPr lang="en-US" altLang="ko-KR" dirty="0" smtClean="0"/>
+              <a:t>)</a:t>
+            </a:r>
+          </a:p>
+          <a:p>
+            <a:pPr marL="285750" indent="-285750">
+              <a:buFont typeface="Arial" panose="020B0604020202020204" pitchFamily="34" charset="0"/>
+              <a:buChar char="•"/>
+            </a:pPr>
+            <a:endParaRPr lang="en-US" altLang="ko-KR" dirty="0"/>
+          </a:p>
+          <a:p>
+            <a:pPr marL="285750" indent="-285750">
+              <a:buFont typeface="Arial" panose="020B0604020202020204" pitchFamily="34" charset="0"/>
+              <a:buChar char="•"/>
+            </a:pPr>
+            <a:r>
+              <a:rPr lang="en-US" altLang="ko-KR" dirty="0" smtClean="0"/>
+              <a:t>Contextual Suggestion(</a:t>
+            </a:r>
+            <a:r>
+              <a:rPr lang="ko-KR" altLang="en-US" dirty="0" smtClean="0"/>
+              <a:t>문맥 제안</a:t>
+            </a:r>
+            <a:r>
+              <a:rPr lang="en-US" altLang="ko-KR" dirty="0" smtClean="0"/>
+              <a:t>)</a:t>
+            </a:r>
+          </a:p>
+          <a:p>
+            <a:pPr marL="285750" indent="-285750">
+              <a:buFont typeface="Arial" panose="020B0604020202020204" pitchFamily="34" charset="0"/>
+              <a:buChar char="•"/>
+            </a:pPr>
+            <a:endParaRPr lang="en-US" altLang="ko-KR" dirty="0"/>
+          </a:p>
+          <a:p>
+            <a:pPr marL="285750" indent="-285750">
+              <a:buFont typeface="Arial" panose="020B0604020202020204" pitchFamily="34" charset="0"/>
+              <a:buChar char="•"/>
+            </a:pPr>
+            <a:r>
+              <a:rPr lang="ko-KR" altLang="en-US" dirty="0" smtClean="0"/>
+              <a:t>의학</a:t>
+            </a:r>
+            <a:r>
+              <a:rPr lang="en-US" altLang="ko-KR" dirty="0" smtClean="0"/>
+              <a:t>, </a:t>
+            </a:r>
+            <a:r>
+              <a:rPr lang="ko-KR" altLang="en-US" smtClean="0"/>
+              <a:t>화학 정보 검색</a:t>
+            </a:r>
+            <a:endParaRPr lang="ko-KR" altLang="en-US" dirty="0"/>
+          </a:p>
+        </p:txBody>
+      </p:sp>
+    </p:spTree>
+    <p:extLst>
+      <p:ext uri="{BB962C8B-B14F-4D97-AF65-F5344CB8AC3E}">
+        <p14:creationId xmlns:p14="http://schemas.microsoft.com/office/powerpoint/2010/main" val="381428704"/>
+      </p:ext>
+    </p:extLst>
+  </p:cSld>
+  <p:clrMapOvr>
+    <a:masterClrMapping/>
+  </p:clrMapOvr>
+  <p:timing>
+    <p:tnLst>
+      <p:par>
+        <p:cTn id="1" dur="indefinite" restart="never" nodeType="tmRoot"/>
+      </p:par>
+    </p:tnLst>
+  </p:timing>
+</p:sld>
+</file>
+
+<file path=ppt/slides/slide14.xml><?xml version="1.0" encoding="utf-8"?>
+<p:sld xmlns:a="http://schemas.openxmlformats.org/drawingml/2006/main" xmlns:r="http://schemas.openxmlformats.org/officeDocument/2006/relationships" xmlns:p="http://schemas.openxmlformats.org/presentationml/2006/main">
+  <p:cSld>
+    <p:spTree>
+      <p:nvGrpSpPr>
+        <p:cNvPr id="1" name=""/>
+        <p:cNvGrpSpPr/>
+        <p:nvPr/>
+      </p:nvGrpSpPr>
+      <p:grpSpPr>
+        <a:xfrm>
+          <a:off x="0" y="0"/>
+          <a:ext cx="0" cy="0"/>
+          <a:chOff x="0" y="0"/>
+          <a:chExt cx="0" cy="0"/>
+        </a:xfrm>
+      </p:grpSpPr>
+      <p:sp>
+        <p:nvSpPr>
+          <p:cNvPr id="2" name="제목 1"/>
+          <p:cNvSpPr>
+            <a:spLocks noGrp="1"/>
+          </p:cNvSpPr>
+          <p:nvPr>
+            <p:ph type="title"/>
+          </p:nvPr>
+        </p:nvSpPr>
+        <p:spPr>
+          <a:xfrm>
+            <a:off x="252000" y="298748"/>
+            <a:ext cx="8640000" cy="338554"/>
+          </a:xfrm>
+        </p:spPr>
+        <p:txBody>
+          <a:bodyPr/>
+          <a:lstStyle/>
+          <a:p>
+            <a:pPr>
+              <a:defRPr/>
+            </a:pPr>
+            <a:r>
+              <a:rPr lang="en-US" altLang="ko-KR" dirty="0" smtClean="0"/>
+              <a:t>4. </a:t>
+            </a:r>
+            <a:r>
+              <a:rPr lang="ko-KR" altLang="en-US" dirty="0" smtClean="0"/>
+              <a:t>과제 진행 사항 </a:t>
+            </a:r>
+            <a:r>
+              <a:rPr lang="en-US" altLang="ko-KR" dirty="0" smtClean="0"/>
+              <a:t>- ERD</a:t>
+            </a:r>
+            <a:endParaRPr lang="ko-KR" altLang="en-US" dirty="0"/>
+          </a:p>
+        </p:txBody>
+      </p:sp>
+      <p:pic>
+        <p:nvPicPr>
+          <p:cNvPr id="1027" name="Picture 3" descr="C:\Users\Naver.AL00039501\Desktop\ERD.png"/>
+          <p:cNvPicPr>
+            <a:picLocks noChangeAspect="1" noChangeArrowheads="1"/>
+          </p:cNvPicPr>
+          <p:nvPr/>
+        </p:nvPicPr>
+        <p:blipFill>
+          <a:blip r:embed="rId3">
+            <a:extLst>
+              <a:ext uri="{28A0092B-C50C-407E-A947-70E740481C1C}">
+                <a14:useLocalDpi xmlns:a14="http://schemas.microsoft.com/office/drawing/2010/main" val="0"/>
+              </a:ext>
+            </a:extLst>
+          </a:blip>
+          <a:srcRect/>
+          <a:stretch>
+            <a:fillRect/>
+          </a:stretch>
+        </p:blipFill>
+        <p:spPr bwMode="auto">
+          <a:xfrm>
+            <a:off x="1115616" y="1556792"/>
+            <a:ext cx="6697663" cy="4076700"/>
+          </a:xfrm>
+          <a:prstGeom prst="rect">
+            <a:avLst/>
+          </a:prstGeom>
+          <a:noFill/>
+          <a:extLst>
+            <a:ext uri="{909E8E84-426E-40DD-AFC4-6F175D3DCCD1}">
+              <a14:hiddenFill xmlns:a14="http://schemas.microsoft.com/office/drawing/2010/main">
+                <a:solidFill>
+                  <a:srgbClr val="FFFFFF"/>
+                </a:solidFill>
+              </a14:hiddenFill>
+            </a:ext>
+          </a:extLst>
+        </p:spPr>
+      </p:pic>
+    </p:spTree>
+    <p:extLst>
+      <p:ext uri="{BB962C8B-B14F-4D97-AF65-F5344CB8AC3E}">
+        <p14:creationId xmlns:p14="http://schemas.microsoft.com/office/powerpoint/2010/main" val="3355958564"/>
+      </p:ext>
+    </p:extLst>
+  </p:cSld>
+  <p:clrMapOvr>
+    <a:masterClrMapping/>
+  </p:clrMapOvr>
+  <p:timing>
+    <p:tnLst>
+      <p:par>
+        <p:cTn id="1" dur="indefinite" restart="never" nodeType="tmRoot"/>
+      </p:par>
+    </p:tnLst>
+  </p:timing>
+</p:sld>
+</file>
+
+<file path=ppt/slides/slide15.xml><?xml version="1.0" encoding="utf-8"?>
+<p:sld xmlns:a="http://schemas.openxmlformats.org/drawingml/2006/main" xmlns:r="http://schemas.openxmlformats.org/officeDocument/2006/relationships" xmlns:p="http://schemas.openxmlformats.org/presentationml/2006/main">
+  <p:cSld>
+    <p:spTree>
+      <p:nvGrpSpPr>
+        <p:cNvPr id="1" name=""/>
+        <p:cNvGrpSpPr/>
+        <p:nvPr/>
+      </p:nvGrpSpPr>
+      <p:grpSpPr>
+        <a:xfrm>
+          <a:off x="0" y="0"/>
+          <a:ext cx="0" cy="0"/>
+          <a:chOff x="0" y="0"/>
+          <a:chExt cx="0" cy="0"/>
+        </a:xfrm>
+      </p:grpSpPr>
+      <p:sp>
+        <p:nvSpPr>
+          <p:cNvPr id="2" name="제목 1"/>
+          <p:cNvSpPr>
+            <a:spLocks noGrp="1"/>
+          </p:cNvSpPr>
+          <p:nvPr>
+            <p:ph type="title"/>
+          </p:nvPr>
+        </p:nvSpPr>
+        <p:spPr>
+          <a:xfrm>
+            <a:off x="252000" y="298748"/>
+            <a:ext cx="8640000" cy="338554"/>
+          </a:xfrm>
+        </p:spPr>
+        <p:txBody>
+          <a:bodyPr/>
+          <a:lstStyle/>
+          <a:p>
+            <a:pPr>
+              <a:defRPr/>
+            </a:pPr>
+            <a:r>
+              <a:rPr lang="en-US" altLang="ko-KR" dirty="0" smtClean="0"/>
+              <a:t>4. </a:t>
+            </a:r>
+            <a:r>
+              <a:rPr lang="ko-KR" altLang="en-US" dirty="0" smtClean="0"/>
+              <a:t>과제 진행 사항 </a:t>
+            </a:r>
+            <a:r>
+              <a:rPr lang="en-US" altLang="ko-KR" dirty="0" smtClean="0"/>
+              <a:t>- </a:t>
+            </a:r>
+            <a:r>
+              <a:rPr lang="ko-KR" altLang="en-US" dirty="0" err="1" smtClean="0"/>
+              <a:t>댓글</a:t>
+            </a:r>
+            <a:endParaRPr lang="ko-KR" altLang="en-US" dirty="0"/>
+          </a:p>
+        </p:txBody>
+      </p:sp>
+      <p:pic>
+        <p:nvPicPr>
+          <p:cNvPr id="1026" name="Picture 2" descr="C:\Users\Naver.AL00039501\Desktop\댓글.png"/>
+          <p:cNvPicPr>
+            <a:picLocks noChangeAspect="1" noChangeArrowheads="1"/>
+          </p:cNvPicPr>
+          <p:nvPr/>
+        </p:nvPicPr>
+        <p:blipFill>
+          <a:blip r:embed="rId3">
+            <a:extLst>
+              <a:ext uri="{28A0092B-C50C-407E-A947-70E740481C1C}">
+                <a14:useLocalDpi xmlns:a14="http://schemas.microsoft.com/office/drawing/2010/main" val="0"/>
+              </a:ext>
+            </a:extLst>
+          </a:blip>
+          <a:srcRect/>
+          <a:stretch>
+            <a:fillRect/>
+          </a:stretch>
+        </p:blipFill>
+        <p:spPr bwMode="auto">
+          <a:xfrm>
+            <a:off x="611560" y="1700808"/>
+            <a:ext cx="7459663" cy="4276725"/>
+          </a:xfrm>
+          <a:prstGeom prst="rect">
+            <a:avLst/>
+          </a:prstGeom>
+          <a:noFill/>
+          <a:extLst>
+            <a:ext uri="{909E8E84-426E-40DD-AFC4-6F175D3DCCD1}">
+              <a14:hiddenFill xmlns:a14="http://schemas.microsoft.com/office/drawing/2010/main">
+                <a:solidFill>
+                  <a:srgbClr val="FFFFFF"/>
+                </a:solidFill>
+              </a14:hiddenFill>
+            </a:ext>
+          </a:extLst>
+        </p:spPr>
+      </p:pic>
+    </p:spTree>
+    <p:extLst>
+      <p:ext uri="{BB962C8B-B14F-4D97-AF65-F5344CB8AC3E}">
+        <p14:creationId xmlns:p14="http://schemas.microsoft.com/office/powerpoint/2010/main" val="407393681"/>
+      </p:ext>
+    </p:extLst>
+  </p:cSld>
+  <p:clrMapOvr>
+    <a:masterClrMapping/>
+  </p:clrMapOvr>
+  <p:timing>
+    <p:tnLst>
+      <p:par>
+        <p:cTn id="1" dur="indefinite" restart="never" nodeType="tmRoot"/>
+      </p:par>
+    </p:tnLst>
+  </p:timing>
+</p:sld>
+</file>
+
+<file path=ppt/slides/slide16.xml><?xml version="1.0" encoding="utf-8"?>
+<p:sld xmlns:a="http://schemas.openxmlformats.org/drawingml/2006/main" xmlns:r="http://schemas.openxmlformats.org/officeDocument/2006/relationships" xmlns:p="http://schemas.openxmlformats.org/presentationml/2006/main">
+  <p:cSld>
+    <p:spTree>
+      <p:nvGrpSpPr>
+        <p:cNvPr id="1" name=""/>
+        <p:cNvGrpSpPr/>
+        <p:nvPr/>
+      </p:nvGrpSpPr>
+      <p:grpSpPr>
+        <a:xfrm>
+          <a:off x="0" y="0"/>
+          <a:ext cx="0" cy="0"/>
+          <a:chOff x="0" y="0"/>
+          <a:chExt cx="0" cy="0"/>
+        </a:xfrm>
+      </p:grpSpPr>
+      <p:sp>
+        <p:nvSpPr>
+          <p:cNvPr id="2" name="제목 1"/>
+          <p:cNvSpPr>
+            <a:spLocks noGrp="1"/>
+          </p:cNvSpPr>
+          <p:nvPr>
+            <p:ph type="title"/>
+          </p:nvPr>
+        </p:nvSpPr>
+        <p:spPr>
+          <a:xfrm>
+            <a:off x="252000" y="298748"/>
+            <a:ext cx="8640000" cy="338554"/>
+          </a:xfrm>
+        </p:spPr>
+        <p:txBody>
+          <a:bodyPr/>
+          <a:lstStyle/>
+          <a:p>
+            <a:pPr>
+              <a:defRPr/>
+            </a:pPr>
+            <a:r>
+              <a:rPr lang="en-US" altLang="ko-KR" dirty="0" smtClean="0"/>
+              <a:t>4. </a:t>
+            </a:r>
+            <a:r>
+              <a:rPr lang="ko-KR" altLang="en-US" dirty="0" smtClean="0"/>
+              <a:t>과제 진행 사항 </a:t>
+            </a:r>
+            <a:r>
+              <a:rPr lang="en-US" altLang="ko-KR" dirty="0" smtClean="0"/>
+              <a:t>- </a:t>
+            </a:r>
+            <a:r>
+              <a:rPr lang="ko-KR" altLang="en-US" dirty="0" smtClean="0"/>
+              <a:t>카테고리</a:t>
+            </a:r>
+            <a:endParaRPr lang="ko-KR" altLang="en-US" dirty="0"/>
+          </a:p>
+        </p:txBody>
+      </p:sp>
+      <p:pic>
+        <p:nvPicPr>
+          <p:cNvPr id="2050" name="Picture 2" descr="C:\Users\Naver.AL00039501\Desktop\카테고리.png"/>
+          <p:cNvPicPr>
+            <a:picLocks noChangeAspect="1" noChangeArrowheads="1"/>
+          </p:cNvPicPr>
+          <p:nvPr/>
+        </p:nvPicPr>
+        <p:blipFill>
+          <a:blip r:embed="rId3">
+            <a:extLst>
+              <a:ext uri="{28A0092B-C50C-407E-A947-70E740481C1C}">
+                <a14:useLocalDpi xmlns:a14="http://schemas.microsoft.com/office/drawing/2010/main" val="0"/>
+              </a:ext>
+            </a:extLst>
+          </a:blip>
+          <a:srcRect/>
+          <a:stretch>
+            <a:fillRect/>
+          </a:stretch>
+        </p:blipFill>
+        <p:spPr bwMode="auto">
+          <a:xfrm>
+            <a:off x="899592" y="1916832"/>
+            <a:ext cx="6916738" cy="3581400"/>
+          </a:xfrm>
+          <a:prstGeom prst="rect">
+            <a:avLst/>
+          </a:prstGeom>
+          <a:noFill/>
+          <a:extLst>
+            <a:ext uri="{909E8E84-426E-40DD-AFC4-6F175D3DCCD1}">
+              <a14:hiddenFill xmlns:a14="http://schemas.microsoft.com/office/drawing/2010/main">
+                <a:solidFill>
+                  <a:srgbClr val="FFFFFF"/>
+                </a:solidFill>
+              </a14:hiddenFill>
+            </a:ext>
+          </a:extLst>
+        </p:spPr>
+      </p:pic>
+    </p:spTree>
+    <p:extLst>
+      <p:ext uri="{BB962C8B-B14F-4D97-AF65-F5344CB8AC3E}">
+        <p14:creationId xmlns:p14="http://schemas.microsoft.com/office/powerpoint/2010/main" val="2895568334"/>
+      </p:ext>
+    </p:extLst>
+  </p:cSld>
+  <p:clrMapOvr>
+    <a:masterClrMapping/>
+  </p:clrMapOvr>
+  <p:timing>
+    <p:tnLst>
+      <p:par>
+        <p:cTn id="1" dur="indefinite" restart="never" nodeType="tmRoot"/>
+      </p:par>
+    </p:tnLst>
+  </p:timing>
+</p:sld>
+</file>
+
+<file path=ppt/slides/slide17.xml><?xml version="1.0" encoding="utf-8"?>
+<p:sld xmlns:a="http://schemas.openxmlformats.org/drawingml/2006/main" xmlns:r="http://schemas.openxmlformats.org/officeDocument/2006/relationships" xmlns:p="http://schemas.openxmlformats.org/presentationml/2006/main">
+  <p:cSld>
+    <p:spTree>
+      <p:nvGrpSpPr>
+        <p:cNvPr id="1" name=""/>
+        <p:cNvGrpSpPr/>
+        <p:nvPr/>
+      </p:nvGrpSpPr>
+      <p:grpSpPr>
+        <a:xfrm>
+          <a:off x="0" y="0"/>
+          <a:ext cx="0" cy="0"/>
+          <a:chOff x="0" y="0"/>
+          <a:chExt cx="0" cy="0"/>
+        </a:xfrm>
+      </p:grpSpPr>
+      <p:sp>
+        <p:nvSpPr>
+          <p:cNvPr id="2" name="제목 1"/>
+          <p:cNvSpPr>
+            <a:spLocks noGrp="1"/>
+          </p:cNvSpPr>
+          <p:nvPr>
+            <p:ph type="title"/>
+          </p:nvPr>
+        </p:nvSpPr>
+        <p:spPr>
+          <a:xfrm>
+            <a:off x="252000" y="298748"/>
+            <a:ext cx="8640000" cy="338554"/>
+          </a:xfrm>
+        </p:spPr>
+        <p:txBody>
+          <a:bodyPr/>
+          <a:lstStyle/>
+          <a:p>
+            <a:pPr>
+              <a:defRPr/>
+            </a:pPr>
+            <a:r>
+              <a:rPr lang="en-US" altLang="ko-KR" dirty="0" smtClean="0"/>
+              <a:t>4. </a:t>
+            </a:r>
+            <a:r>
+              <a:rPr lang="ko-KR" altLang="en-US" dirty="0" smtClean="0"/>
+              <a:t>과제 진행 </a:t>
+            </a:r>
+            <a:r>
+              <a:rPr lang="ko-KR" altLang="en-US" dirty="0"/>
+              <a:t>사항 </a:t>
+            </a:r>
+            <a:r>
+              <a:rPr lang="en-US" altLang="ko-KR" dirty="0"/>
+              <a:t>– </a:t>
+            </a:r>
+            <a:r>
+              <a:rPr lang="ko-KR" altLang="en-US" dirty="0" err="1" smtClean="0"/>
+              <a:t>답글</a:t>
+            </a:r>
+            <a:endParaRPr lang="ko-KR" altLang="en-US" dirty="0"/>
+          </a:p>
+        </p:txBody>
+      </p:sp>
+      <p:pic>
+        <p:nvPicPr>
+          <p:cNvPr id="3074" name="Picture 2" descr="C:\Users\Naver.AL00039501\Desktop\답글.png"/>
+          <p:cNvPicPr>
+            <a:picLocks noChangeAspect="1" noChangeArrowheads="1"/>
+          </p:cNvPicPr>
+          <p:nvPr/>
+        </p:nvPicPr>
+        <p:blipFill>
+          <a:blip r:embed="rId3">
+            <a:extLst>
+              <a:ext uri="{28A0092B-C50C-407E-A947-70E740481C1C}">
+                <a14:useLocalDpi xmlns:a14="http://schemas.microsoft.com/office/drawing/2010/main" val="0"/>
+              </a:ext>
+            </a:extLst>
+          </a:blip>
+          <a:srcRect/>
+          <a:stretch>
+            <a:fillRect/>
+          </a:stretch>
+        </p:blipFill>
+        <p:spPr bwMode="auto">
+          <a:xfrm>
+            <a:off x="1403648" y="2060848"/>
+            <a:ext cx="6336704" cy="3457158"/>
+          </a:xfrm>
+          <a:prstGeom prst="rect">
+            <a:avLst/>
+          </a:prstGeom>
+          <a:noFill/>
+          <a:extLst>
+            <a:ext uri="{909E8E84-426E-40DD-AFC4-6F175D3DCCD1}">
+              <a14:hiddenFill xmlns:a14="http://schemas.microsoft.com/office/drawing/2010/main">
+                <a:solidFill>
+                  <a:srgbClr val="FFFFFF"/>
+                </a:solidFill>
+              </a14:hiddenFill>
+            </a:ext>
+          </a:extLst>
+        </p:spPr>
+      </p:pic>
+    </p:spTree>
+    <p:extLst>
+      <p:ext uri="{BB962C8B-B14F-4D97-AF65-F5344CB8AC3E}">
+        <p14:creationId xmlns:p14="http://schemas.microsoft.com/office/powerpoint/2010/main" val="3888571443"/>
+      </p:ext>
+    </p:extLst>
+  </p:cSld>
+  <p:clrMapOvr>
+    <a:masterClrMapping/>
+  </p:clrMapOvr>
+  <p:timing>
+    <p:tnLst>
+      <p:par>
+        <p:cTn id="1" dur="indefinite" restart="never" nodeType="tmRoot"/>
+      </p:par>
+    </p:tnLst>
+  </p:timing>
+</p:sld>
+</file>
+
+<file path=ppt/slides/slide18.xml><?xml version="1.0" encoding="utf-8"?>
+<p:sld xmlns:a="http://schemas.openxmlformats.org/drawingml/2006/main" xmlns:r="http://schemas.openxmlformats.org/officeDocument/2006/relationships" xmlns:p="http://schemas.openxmlformats.org/presentationml/2006/main">
+  <p:cSld>
+    <p:spTree>
+      <p:nvGrpSpPr>
+        <p:cNvPr id="1" name=""/>
+        <p:cNvGrpSpPr/>
+        <p:nvPr/>
+      </p:nvGrpSpPr>
+      <p:grpSpPr>
+        <a:xfrm>
+          <a:off x="0" y="0"/>
+          <a:ext cx="0" cy="0"/>
+          <a:chOff x="0" y="0"/>
+          <a:chExt cx="0" cy="0"/>
+        </a:xfrm>
+      </p:grpSpPr>
+      <p:sp>
+        <p:nvSpPr>
+          <p:cNvPr id="2" name="제목 1"/>
+          <p:cNvSpPr>
+            <a:spLocks noGrp="1"/>
+          </p:cNvSpPr>
+          <p:nvPr>
+            <p:ph type="title"/>
+          </p:nvPr>
+        </p:nvSpPr>
+        <p:spPr>
+          <a:xfrm>
+            <a:off x="252000" y="298748"/>
+            <a:ext cx="8640000" cy="338554"/>
+          </a:xfrm>
+        </p:spPr>
+        <p:txBody>
+          <a:bodyPr/>
+          <a:lstStyle/>
+          <a:p>
+            <a:pPr>
+              <a:defRPr/>
+            </a:pPr>
+            <a:r>
+              <a:rPr lang="en-US" altLang="ko-KR" dirty="0" smtClean="0"/>
+              <a:t>4. </a:t>
+            </a:r>
+            <a:r>
+              <a:rPr lang="ko-KR" altLang="en-US" dirty="0" smtClean="0"/>
+              <a:t>과제 진행 사항 </a:t>
+            </a:r>
+            <a:r>
+              <a:rPr lang="en-US" altLang="ko-KR" dirty="0" smtClean="0"/>
+              <a:t>– </a:t>
+            </a:r>
+            <a:r>
+              <a:rPr lang="ko-KR" altLang="en-US" dirty="0" err="1" smtClean="0"/>
+              <a:t>답글</a:t>
+            </a:r>
+            <a:r>
+              <a:rPr lang="ko-KR" altLang="en-US" dirty="0" smtClean="0"/>
+              <a:t> </a:t>
+            </a:r>
+            <a:r>
+              <a:rPr lang="en-US" altLang="ko-KR" dirty="0" smtClean="0"/>
+              <a:t>DB</a:t>
+            </a:r>
+            <a:endParaRPr lang="ko-KR" altLang="en-US" dirty="0"/>
+          </a:p>
+        </p:txBody>
+      </p:sp>
+      <p:pic>
+        <p:nvPicPr>
+          <p:cNvPr id="1027" name="Picture 3" descr="C:\Users\Naver.AL00039501\Desktop\답글 dB.png"/>
+          <p:cNvPicPr>
+            <a:picLocks noChangeAspect="1" noChangeArrowheads="1"/>
+          </p:cNvPicPr>
+          <p:nvPr/>
+        </p:nvPicPr>
+        <p:blipFill>
+          <a:blip r:embed="rId3">
+            <a:extLst>
+              <a:ext uri="{28A0092B-C50C-407E-A947-70E740481C1C}">
+                <a14:useLocalDpi xmlns:a14="http://schemas.microsoft.com/office/drawing/2010/main" val="0"/>
+              </a:ext>
+            </a:extLst>
+          </a:blip>
+          <a:srcRect/>
+          <a:stretch>
+            <a:fillRect/>
+          </a:stretch>
+        </p:blipFill>
+        <p:spPr bwMode="auto">
+          <a:xfrm>
+            <a:off x="0" y="2259991"/>
+            <a:ext cx="9144000" cy="2233924"/>
+          </a:xfrm>
+          <a:prstGeom prst="rect">
+            <a:avLst/>
+          </a:prstGeom>
+          <a:noFill/>
+          <a:extLst>
+            <a:ext uri="{909E8E84-426E-40DD-AFC4-6F175D3DCCD1}">
+              <a14:hiddenFill xmlns:a14="http://schemas.microsoft.com/office/drawing/2010/main">
+                <a:solidFill>
+                  <a:srgbClr val="FFFFFF"/>
+                </a:solidFill>
+              </a14:hiddenFill>
+            </a:ext>
+          </a:extLst>
+        </p:spPr>
+      </p:pic>
+    </p:spTree>
+    <p:extLst>
+      <p:ext uri="{BB962C8B-B14F-4D97-AF65-F5344CB8AC3E}">
+        <p14:creationId xmlns:p14="http://schemas.microsoft.com/office/powerpoint/2010/main" val="2362824376"/>
+      </p:ext>
+    </p:extLst>
+  </p:cSld>
+  <p:clrMapOvr>
+    <a:masterClrMapping/>
+  </p:clrMapOvr>
+  <p:timing>
+    <p:tnLst>
+      <p:par>
+        <p:cTn id="1" dur="indefinite" restart="never" nodeType="tmRoot"/>
+      </p:par>
+    </p:tnLst>
+  </p:timing>
+</p:sld>
+</file>
+
+<file path=ppt/slides/slide19.xml><?xml version="1.0" encoding="utf-8"?>
+<p:sld xmlns:a="http://schemas.openxmlformats.org/drawingml/2006/main" xmlns:r="http://schemas.openxmlformats.org/officeDocument/2006/relationships" xmlns:p="http://schemas.openxmlformats.org/presentationml/2006/main">
+  <p:cSld>
+    <p:spTree>
+      <p:nvGrpSpPr>
+        <p:cNvPr id="1" name=""/>
+        <p:cNvGrpSpPr/>
+        <p:nvPr/>
+      </p:nvGrpSpPr>
+      <p:grpSpPr>
+        <a:xfrm>
+          <a:off x="0" y="0"/>
+          <a:ext cx="0" cy="0"/>
+          <a:chOff x="0" y="0"/>
+          <a:chExt cx="0" cy="0"/>
+        </a:xfrm>
+      </p:grpSpPr>
+      <p:sp>
+        <p:nvSpPr>
+          <p:cNvPr id="2" name="제목 1"/>
+          <p:cNvSpPr>
+            <a:spLocks noGrp="1"/>
+          </p:cNvSpPr>
+          <p:nvPr>
+            <p:ph type="title"/>
+          </p:nvPr>
+        </p:nvSpPr>
+        <p:spPr/>
+        <p:txBody>
+          <a:bodyPr>
+            <a:noAutofit/>
+          </a:bodyPr>
+          <a:lstStyle/>
+          <a:p>
+            <a:r>
+              <a:rPr lang="en-US" altLang="ko-KR" sz="4500" dirty="0" smtClean="0">
+                <a:latin typeface="+mj-ea"/>
+                <a:ea typeface="+mj-ea"/>
+              </a:rPr>
+              <a:t>End of Document</a:t>
+            </a:r>
+            <a:endParaRPr lang="ko-KR" altLang="en-US" sz="4500" dirty="0">
+              <a:latin typeface="+mj-ea"/>
+              <a:ea typeface="+mj-ea"/>
+            </a:endParaRPr>
+          </a:p>
+        </p:txBody>
+      </p:sp>
+    </p:spTree>
+    <p:extLst>
+      <p:ext uri="{BB962C8B-B14F-4D97-AF65-F5344CB8AC3E}">
+        <p14:creationId xmlns:p14="http://schemas.microsoft.com/office/powerpoint/2010/main" val="4157591422"/>
+      </p:ext>
+    </p:extLst>
+  </p:cSld>
+  <p:clrMapOvr>
+    <a:masterClrMapping/>
+  </p:clrMapOvr>
+  <p:timing>
+    <p:tnLst>
+      <p:par>
+        <p:cTn id="1" dur="indefinite" restart="never" nodeType="tmRoot"/>
+      </p:par>
+    </p:tnLst>
+  </p:timing>
+</p:sld>
+</file>
+
 <file path=ppt/slides/slide2.xml><?xml version="1.0" encoding="utf-8"?>
 <p:sld xmlns:a="http://schemas.openxmlformats.org/drawingml/2006/main" xmlns:r="http://schemas.openxmlformats.org/officeDocument/2006/relationships" xmlns:p="http://schemas.openxmlformats.org/presentationml/2006/main">
   <p:cSld>
@@ -4594,6 +7113,220 @@
             </a:r>
             <a:r>
               <a:rPr lang="ko-KR" altLang="en-US" dirty="0" smtClean="0"/>
+              <a:t>목차</a:t>
+            </a:r>
+            <a:endParaRPr lang="ko-KR" altLang="en-US" dirty="0"/>
+          </a:p>
+        </p:txBody>
+      </p:sp>
+      <p:sp>
+        <p:nvSpPr>
+          <p:cNvPr id="3" name="내용 개체 틀 2"/>
+          <p:cNvSpPr>
+            <a:spLocks noGrp="1"/>
+          </p:cNvSpPr>
+          <p:nvPr>
+            <p:ph idx="1"/>
+          </p:nvPr>
+        </p:nvSpPr>
+        <p:spPr/>
+        <p:txBody>
+          <a:bodyPr/>
+          <a:lstStyle/>
+          <a:p>
+            <a:pPr marL="285750" indent="-285750">
+              <a:buFont typeface="Arial" panose="020B0604020202020204" pitchFamily="34" charset="0"/>
+              <a:buChar char="•"/>
+            </a:pPr>
+            <a:r>
+              <a:rPr lang="en-US" altLang="ko-KR" sz="2000" dirty="0" smtClean="0"/>
+              <a:t>1.Index</a:t>
+            </a:r>
+          </a:p>
+          <a:p>
+            <a:pPr marL="285750" indent="-285750">
+              <a:buFont typeface="Arial" panose="020B0604020202020204" pitchFamily="34" charset="0"/>
+              <a:buChar char="•"/>
+            </a:pPr>
+            <a:r>
+              <a:rPr lang="en-US" altLang="ko-KR" sz="2000" dirty="0" smtClean="0"/>
+              <a:t>2.Elastic Search &amp; </a:t>
+            </a:r>
+            <a:r>
+              <a:rPr lang="ko-KR" altLang="en-US" sz="2000" dirty="0" smtClean="0"/>
+              <a:t>검색 엔진</a:t>
+            </a:r>
+            <a:endParaRPr lang="en-US" altLang="ko-KR" sz="2000" dirty="0" smtClean="0"/>
+          </a:p>
+          <a:p>
+            <a:pPr marL="465750" lvl="1" indent="-285750">
+              <a:buFont typeface="Arial" panose="020B0604020202020204" pitchFamily="34" charset="0"/>
+              <a:buChar char="•"/>
+            </a:pPr>
+            <a:r>
+              <a:rPr lang="ko-KR" altLang="en-US" sz="1400" dirty="0" smtClean="0"/>
+              <a:t>형태소 분석</a:t>
+            </a:r>
+            <a:r>
+              <a:rPr lang="en-US" altLang="ko-KR" sz="1400" dirty="0" smtClean="0"/>
+              <a:t>, Vector Space Model</a:t>
+            </a:r>
+          </a:p>
+          <a:p>
+            <a:pPr marL="285750" indent="-285750">
+              <a:buFont typeface="Arial" panose="020B0604020202020204" pitchFamily="34" charset="0"/>
+              <a:buChar char="•"/>
+            </a:pPr>
+            <a:r>
+              <a:rPr lang="en-US" altLang="ko-KR" sz="2000" dirty="0" smtClean="0"/>
+              <a:t>3.</a:t>
+            </a:r>
+            <a:r>
+              <a:rPr lang="ko-KR" altLang="en-US" sz="2000" dirty="0" smtClean="0"/>
+              <a:t>현재의 검색 엔진</a:t>
+            </a:r>
+            <a:endParaRPr lang="en-US" altLang="ko-KR" sz="2000" dirty="0" smtClean="0"/>
+          </a:p>
+          <a:p>
+            <a:pPr marL="465750" lvl="1" indent="-285750">
+              <a:buFont typeface="Arial" panose="020B0604020202020204" pitchFamily="34" charset="0"/>
+              <a:buChar char="•"/>
+            </a:pPr>
+            <a:r>
+              <a:rPr lang="en-US" altLang="ko-KR" sz="1400" dirty="0" smtClean="0"/>
+              <a:t>LSTM, </a:t>
+            </a:r>
+            <a:r>
+              <a:rPr lang="ko-KR" altLang="en-US" sz="1400" dirty="0" smtClean="0"/>
+              <a:t>이미지 검색</a:t>
+            </a:r>
+            <a:r>
+              <a:rPr lang="en-US" altLang="ko-KR" sz="1400" dirty="0" smtClean="0"/>
+              <a:t>, </a:t>
+            </a:r>
+            <a:r>
+              <a:rPr lang="ko-KR" altLang="en-US" sz="1400" dirty="0" err="1" smtClean="0"/>
+              <a:t>그외</a:t>
+            </a:r>
+            <a:endParaRPr lang="en-US" altLang="ko-KR" sz="1400" dirty="0" smtClean="0"/>
+          </a:p>
+          <a:p>
+            <a:pPr marL="285750" indent="-285750">
+              <a:buFont typeface="Arial" panose="020B0604020202020204" pitchFamily="34" charset="0"/>
+              <a:buChar char="•"/>
+            </a:pPr>
+            <a:r>
+              <a:rPr lang="en-US" altLang="ko-KR" sz="2000" dirty="0" smtClean="0"/>
+              <a:t>4.</a:t>
+            </a:r>
+            <a:r>
+              <a:rPr lang="ko-KR" altLang="en-US" sz="2000" dirty="0" smtClean="0"/>
+              <a:t>과제 진행 사항</a:t>
+            </a:r>
+            <a:endParaRPr lang="en-US" altLang="ko-KR" sz="2000" dirty="0" smtClean="0"/>
+          </a:p>
+          <a:p>
+            <a:pPr marL="465750" lvl="1" indent="-285750">
+              <a:buFont typeface="Arial" panose="020B0604020202020204" pitchFamily="34" charset="0"/>
+              <a:buChar char="•"/>
+            </a:pPr>
+            <a:r>
+              <a:rPr lang="ko-KR" altLang="en-US" sz="1400" dirty="0" err="1" smtClean="0"/>
+              <a:t>댓글</a:t>
+            </a:r>
+            <a:r>
+              <a:rPr lang="en-US" altLang="ko-KR" sz="1400" dirty="0" smtClean="0"/>
+              <a:t>, </a:t>
+            </a:r>
+            <a:r>
+              <a:rPr lang="ko-KR" altLang="en-US" sz="1400" dirty="0" smtClean="0"/>
+              <a:t>카테고리</a:t>
+            </a:r>
+            <a:r>
+              <a:rPr lang="en-US" altLang="ko-KR" sz="1400" dirty="0" smtClean="0"/>
+              <a:t>, </a:t>
+            </a:r>
+            <a:r>
+              <a:rPr lang="ko-KR" altLang="en-US" sz="1400" dirty="0" err="1" smtClean="0"/>
+              <a:t>답글</a:t>
+            </a:r>
+            <a:endParaRPr lang="en-US" altLang="ko-KR" sz="1400" dirty="0" smtClean="0"/>
+          </a:p>
+          <a:p>
+            <a:pPr marL="285750" indent="-285750">
+              <a:buFont typeface="Arial" panose="020B0604020202020204" pitchFamily="34" charset="0"/>
+              <a:buChar char="•"/>
+            </a:pPr>
+            <a:endParaRPr lang="en-US" altLang="ko-KR" sz="2000" dirty="0" smtClean="0"/>
+          </a:p>
+        </p:txBody>
+      </p:sp>
+    </p:spTree>
+    <p:extLst>
+      <p:ext uri="{BB962C8B-B14F-4D97-AF65-F5344CB8AC3E}">
+        <p14:creationId xmlns:p14="http://schemas.microsoft.com/office/powerpoint/2010/main" val="1522179963"/>
+      </p:ext>
+    </p:extLst>
+  </p:cSld>
+  <p:clrMapOvr>
+    <a:masterClrMapping/>
+  </p:clrMapOvr>
+  <p:timing>
+    <p:tnLst>
+      <p:par>
+        <p:cTn id="1" dur="indefinite" restart="never" nodeType="tmRoot"/>
+      </p:par>
+    </p:tnLst>
+  </p:timing>
+</p:sld>
+</file>
+
+<file path=ppt/slides/slide3.xml><?xml version="1.0" encoding="utf-8"?>
+<p:sld xmlns:a="http://schemas.openxmlformats.org/drawingml/2006/main" xmlns:r="http://schemas.openxmlformats.org/officeDocument/2006/relationships" xmlns:p="http://schemas.openxmlformats.org/presentationml/2006/main">
+  <p:cSld>
+    <p:spTree>
+      <p:nvGrpSpPr>
+        <p:cNvPr id="1" name=""/>
+        <p:cNvGrpSpPr/>
+        <p:nvPr/>
+      </p:nvGrpSpPr>
+      <p:grpSpPr>
+        <a:xfrm>
+          <a:off x="0" y="0"/>
+          <a:ext cx="0" cy="0"/>
+          <a:chOff x="0" y="0"/>
+          <a:chExt cx="0" cy="0"/>
+        </a:xfrm>
+      </p:grpSpPr>
+      <p:sp>
+        <p:nvSpPr>
+          <p:cNvPr id="2" name="제목 1"/>
+          <p:cNvSpPr>
+            <a:spLocks noGrp="1"/>
+          </p:cNvSpPr>
+          <p:nvPr>
+            <p:ph type="title"/>
+          </p:nvPr>
+        </p:nvSpPr>
+        <p:spPr>
+          <a:xfrm>
+            <a:off x="252000" y="298748"/>
+            <a:ext cx="8640000" cy="338554"/>
+          </a:xfrm>
+        </p:spPr>
+        <p:txBody>
+          <a:bodyPr/>
+          <a:lstStyle/>
+          <a:p>
+            <a:pPr>
+              <a:defRPr/>
+            </a:pPr>
+            <a:r>
+              <a:rPr lang="en-US" altLang="ko-KR" dirty="0" smtClean="0"/>
+              <a:t>1. </a:t>
+            </a:r>
+            <a:r>
+              <a:rPr lang="ko-KR" altLang="en-US" dirty="0" smtClean="0"/>
               <a:t>프로젝트 진행 일정</a:t>
             </a:r>
             <a:endParaRPr lang="ko-KR" altLang="en-US" dirty="0"/>
@@ -4610,7 +7343,7 @@
             <p:ph idx="1"/>
             <p:extLst>
               <p:ext uri="{D42A27DB-BD31-4B8C-83A1-F6EECF244321}">
-                <p14:modId xmlns:p14="http://schemas.microsoft.com/office/powerpoint/2010/main" val="2481866667"/>
+                <p14:modId xmlns:p14="http://schemas.microsoft.com/office/powerpoint/2010/main" val="1056736637"/>
               </p:ext>
             </p:extLst>
           </p:nvPr>
@@ -5060,54 +7793,6 @@
                         </a:rPr>
                         <a:t>적용</a:t>
                       </a:r>
-                      <a:r>
-                        <a:rPr lang="en-US" altLang="ko-KR" sz="1800" kern="1200" baseline="0" dirty="0" smtClean="0">
-                          <a:solidFill>
-                            <a:schemeClr val="dk1"/>
-                          </a:solidFill>
-                          <a:effectLst/>
-                          <a:latin typeface="+mn-lt"/>
-                          <a:ea typeface="+mn-ea"/>
-                          <a:cs typeface="+mn-cs"/>
-                        </a:rPr>
-                        <a:t>,</a:t>
-                      </a:r>
-                      <a:r>
-                        <a:rPr lang="en-US" altLang="ko-KR" sz="1800" kern="1200" dirty="0" smtClean="0">
-                          <a:solidFill>
-                            <a:schemeClr val="dk1"/>
-                          </a:solidFill>
-                          <a:effectLst/>
-                          <a:latin typeface="+mn-lt"/>
-                          <a:ea typeface="+mn-ea"/>
-                          <a:cs typeface="+mn-cs"/>
-                        </a:rPr>
-                        <a:t> </a:t>
-                      </a:r>
-                      <a:r>
-                        <a:rPr lang="ko-KR" altLang="ko-KR" sz="1800" kern="1200" dirty="0" err="1" smtClean="0">
-                          <a:solidFill>
-                            <a:schemeClr val="dk1"/>
-                          </a:solidFill>
-                          <a:effectLst/>
-                          <a:latin typeface="+mn-lt"/>
-                          <a:ea typeface="+mn-ea"/>
-                          <a:cs typeface="+mn-cs"/>
-                        </a:rPr>
-                        <a:t>구글</a:t>
-                      </a:r>
-                      <a:r>
-                        <a:rPr lang="ko-KR" altLang="ko-KR" sz="1800" kern="1200" dirty="0" smtClean="0">
-                          <a:solidFill>
-                            <a:schemeClr val="dk1"/>
-                          </a:solidFill>
-                          <a:effectLst/>
-                          <a:latin typeface="+mn-lt"/>
-                          <a:ea typeface="+mn-ea"/>
-                          <a:cs typeface="+mn-cs"/>
-                        </a:rPr>
-                        <a:t> 동영상 연동</a:t>
-                      </a:r>
                       <a:endParaRPr lang="ko-KR" altLang="en-US" dirty="0"/>
                     </a:p>
                   </a:txBody>
@@ -5138,7 +7823,7 @@
 </p:sld>
 </file>
 
-<file path=ppt/slides/slide3.xml><?xml version="1.0" encoding="utf-8"?>
+<file path=ppt/slides/slide4.xml><?xml version="1.0" encoding="utf-8"?>
 <p:sld xmlns:a="http://schemas.openxmlformats.org/drawingml/2006/main" xmlns:r="http://schemas.openxmlformats.org/officeDocument/2006/relationships" xmlns:p="http://schemas.openxmlformats.org/presentationml/2006/main">
   <p:cSld>
     <p:spTree>
@@ -5238,7 +7923,7 @@
             </a:r>
             <a:r>
               <a:rPr lang="en-US" altLang="ko-KR" sz="1400" dirty="0" smtClean="0"/>
-              <a:t>.</a:t>
+              <a:t>. (Relevant)</a:t>
             </a:r>
             <a:endParaRPr lang="en-US" altLang="ko-KR" sz="1400" dirty="0"/>
           </a:p>
@@ -5247,7 +7932,14 @@
               <a:buFont typeface="Arial" panose="020B0604020202020204" pitchFamily="34" charset="0"/>
               <a:buChar char="•"/>
             </a:pPr>
-            <a:endParaRPr lang="en-US" altLang="ko-KR" sz="1400" dirty="0" smtClean="0"/>
+            <a:r>
+              <a:rPr lang="ko-KR" altLang="en-US" sz="1400" dirty="0" smtClean="0"/>
+              <a:t>사용자가 클릭 할만한 정보들을 맨 위에 배치하도록</a:t>
+            </a:r>
+            <a:r>
+              <a:rPr lang="en-US" altLang="ko-KR" sz="1400" dirty="0" smtClean="0"/>
+              <a:t>.</a:t>
+            </a:r>
           </a:p>
           <a:p>
             <a:pPr marL="465750" lvl="1" indent="-285750">
@@ -5326,17 +8018,12 @@
             </a:r>
             <a:r>
               <a:rPr lang="en-US" altLang="ko-KR" sz="1400" dirty="0" smtClean="0"/>
-              <a:t>, </a:t>
-            </a:r>
-            <a:r>
-              <a:rPr lang="en-US" altLang="ko-KR" sz="1400" dirty="0" smtClean="0"/>
-              <a:t>score</a:t>
-            </a:r>
-          </a:p>
-          <a:p>
-            <a:pPr marL="465750" lvl="1" indent="-285750">
-              <a:buFont typeface="Arial" panose="020B0604020202020204" pitchFamily="34" charset="0"/>
-              <a:buChar char="•"/>
+              <a:t>, ranking</a:t>
+            </a:r>
+          </a:p>
+          <a:p>
+            <a:pPr lvl="1" indent="0">
+              <a:buNone/>
             </a:pPr>
             <a:endParaRPr lang="en-US" altLang="ko-KR" sz="1400" dirty="0"/>
           </a:p>
@@ -5486,202 +8173,6 @@
 </p:sld>
 </file>
 
-<file path=ppt/slides/slide4.xml><?xml version="1.0" encoding="utf-8"?>
-<p:sld xmlns:a="http://schemas.openxmlformats.org/drawingml/2006/main" xmlns:r="http://schemas.openxmlformats.org/officeDocument/2006/relationships" xmlns:p="http://schemas.openxmlformats.org/presentationml/2006/main">
-  <p:cSld>
-    <p:spTree>
-      <p:nvGrpSpPr>
-        <p:cNvPr id="1" name=""/>
-        <p:cNvGrpSpPr/>
-        <p:nvPr/>
-      </p:nvGrpSpPr>
-      <p:grpSpPr>
-        <a:xfrm>
-          <a:off x="0" y="0"/>
-          <a:ext cx="0" cy="0"/>
-          <a:chOff x="0" y="0"/>
-          <a:chExt cx="0" cy="0"/>
-        </a:xfrm>
-      </p:grpSpPr>
-      <p:sp>
-        <p:nvSpPr>
-          <p:cNvPr id="2" name="제목 1"/>
-          <p:cNvSpPr>
-            <a:spLocks noGrp="1"/>
-          </p:cNvSpPr>
-          <p:nvPr>
-            <p:ph type="title"/>
-          </p:nvPr>
-        </p:nvSpPr>
-        <p:spPr>
-          <a:xfrm>
-            <a:off x="252000" y="298748"/>
-            <a:ext cx="8640000" cy="584775"/>
-          </a:xfrm>
-        </p:spPr>
-        <p:txBody>
-          <a:bodyPr/>
-          <a:lstStyle/>
-          <a:p>
-            <a:pPr>
-              <a:defRPr/>
-            </a:pPr>
-            <a:r>
-              <a:rPr lang="en-US" altLang="ko-KR" dirty="0" smtClean="0"/>
-              <a:t>2. Elastic Search – </a:t>
-            </a:r>
-            <a:r>
-              <a:rPr lang="ko-KR" altLang="en-US" dirty="0" smtClean="0"/>
-              <a:t>형태소 분석</a:t>
-            </a:r>
-            <a:r>
-              <a:rPr lang="en-US" altLang="ko-KR" dirty="0" smtClean="0"/>
-              <a:t/>
-            </a:r>
-            <a:br>
-              <a:rPr lang="en-US" altLang="ko-KR" dirty="0" smtClean="0"/>
-            </a:br>
-            <a:endParaRPr lang="ko-KR" altLang="en-US" dirty="0"/>
-          </a:p>
-        </p:txBody>
-      </p:sp>
-      <p:sp>
-        <p:nvSpPr>
-          <p:cNvPr id="4" name="내용 개체 틀 3"/>
-          <p:cNvSpPr>
-            <a:spLocks noGrp="1"/>
-          </p:cNvSpPr>
-          <p:nvPr>
-            <p:ph idx="1"/>
-          </p:nvPr>
-        </p:nvSpPr>
-        <p:spPr>
-          <a:xfrm>
-            <a:off x="179512" y="1124744"/>
-            <a:ext cx="7920000" cy="4525963"/>
-          </a:xfrm>
-        </p:spPr>
-        <p:txBody>
-          <a:bodyPr/>
-          <a:lstStyle/>
-          <a:p>
-            <a:r>
-              <a:rPr lang="en-US" altLang="ko-KR" dirty="0">
-                <a:hlinkClick r:id="rId3"/>
-              </a:rPr>
-              <a:t>http://10.110.243.90:9200/seunjeon-idx/_</a:t>
-            </a:r>
-            <a:r>
-              <a:rPr lang="en-US" altLang="ko-KR" dirty="0" smtClean="0">
-                <a:hlinkClick r:id="rId3"/>
-              </a:rPr>
-              <a:t>analyze?analyzer=korean&amp;pretty=true&amp;text=</a:t>
-            </a:r>
-            <a:r>
-              <a:rPr lang="ko-KR" altLang="en-US" dirty="0" smtClean="0">
-                <a:hlinkClick r:id="rId3"/>
-              </a:rPr>
-              <a:t>안녕</a:t>
-            </a:r>
-            <a:r>
-              <a:rPr lang="en-US" altLang="ko-KR" dirty="0" smtClean="0">
-                <a:hlinkClick r:id="rId3"/>
-              </a:rPr>
-              <a:t>%20</a:t>
-            </a:r>
-            <a:r>
-              <a:rPr lang="ko-KR" altLang="en-US" dirty="0" smtClean="0"/>
-              <a:t>하세요</a:t>
-            </a:r>
-            <a:r>
-              <a:rPr lang="en-US" altLang="ko-KR" dirty="0" smtClean="0"/>
-              <a:t>%20</a:t>
-            </a:r>
-            <a:r>
-              <a:rPr lang="ko-KR" altLang="en-US" dirty="0" smtClean="0"/>
-              <a:t>오늘</a:t>
-            </a:r>
-            <a:r>
-              <a:rPr lang="en-US" altLang="ko-KR" dirty="0" smtClean="0"/>
-              <a:t>%20</a:t>
-            </a:r>
-            <a:r>
-              <a:rPr lang="ko-KR" altLang="en-US" dirty="0" smtClean="0"/>
-              <a:t>날씨가</a:t>
-            </a:r>
-            <a:r>
-              <a:rPr lang="en-US" altLang="ko-KR" dirty="0" smtClean="0"/>
-              <a:t>%20</a:t>
-            </a:r>
-            <a:r>
-              <a:rPr lang="ko-KR" altLang="en-US" dirty="0" smtClean="0"/>
-              <a:t>좋네요</a:t>
-            </a:r>
-            <a:endParaRPr lang="ko-KR" altLang="en-US" dirty="0"/>
-          </a:p>
-        </p:txBody>
-      </p:sp>
-      <p:pic>
-        <p:nvPicPr>
-          <p:cNvPr id="7170" name="Picture 2" descr="C:\Users\Naver.AL00039501\Desktop\인덱싱.png"/>
-          <p:cNvPicPr>
-            <a:picLocks noChangeAspect="1" noChangeArrowheads="1"/>
-          </p:cNvPicPr>
-          <p:nvPr/>
-        </p:nvPicPr>
-        <p:blipFill>
-          <a:blip r:embed="rId4">
-            <a:extLst>
-              <a:ext uri="{28A0092B-C50C-407E-A947-70E740481C1C}">
-                <a14:useLocalDpi xmlns:a14="http://schemas.microsoft.com/office/drawing/2010/main" val="0"/>
-              </a:ext>
-            </a:extLst>
-          </a:blip>
-          <a:srcRect/>
-          <a:stretch>
-            <a:fillRect/>
-          </a:stretch>
-        </p:blipFill>
-        <p:spPr bwMode="auto">
-          <a:xfrm>
-            <a:off x="3573157" y="1412776"/>
-            <a:ext cx="1498718" cy="5296442"/>
-          </a:xfrm>
-          <a:prstGeom prst="rect">
-            <a:avLst/>
-          </a:prstGeom>
-          <a:noFill/>
-          <a:extLst>
-            <a:ext uri="{909E8E84-426E-40DD-AFC4-6F175D3DCCD1}">
-              <a14:hiddenFill xmlns:a14="http://schemas.microsoft.com/office/drawing/2010/main">
-                <a:solidFill>
-                  <a:srgbClr val="FFFFFF"/>
-                </a:solidFill>
-              </a14:hiddenFill>
-            </a:ext>
-          </a:extLst>
-        </p:spPr>
-      </p:pic>
-    </p:spTree>
-    <p:extLst>
-      <p:ext uri="{BB962C8B-B14F-4D97-AF65-F5344CB8AC3E}">
-        <p14:creationId xmlns:p14="http://schemas.microsoft.com/office/powerpoint/2010/main" val="770855262"/>
-      </p:ext>
-    </p:extLst>
-  </p:cSld>
-  <p:clrMapOvr>
-    <a:masterClrMapping/>
-  </p:clrMapOvr>
-  <p:timing>
-    <p:tnLst>
-      <p:par>
-        <p:cTn id="1" dur="indefinite" restart="never" nodeType="tmRoot"/>
-      </p:par>
-    </p:tnLst>
-  </p:timing>
-</p:sld>
-</file>
-
 <file path=ppt/slides/slide5.xml><?xml version="1.0" encoding="utf-8"?>
 <p:sld xmlns:a="http://schemas.openxmlformats.org/drawingml/2006/main" xmlns:r="http://schemas.openxmlformats.org/officeDocument/2006/relationships" xmlns:p="http://schemas.openxmlformats.org/presentationml/2006/main">
   <p:cSld>
@@ -5724,63 +8215,7 @@
             </a:pPr>
             <a:r>
               <a:rPr lang="en-US" altLang="ko-KR" dirty="0" smtClean="0"/>
-              <a:t>2. Elastic Search – score</a:t>
-            </a:r>
-            <a:endParaRPr lang="ko-KR" altLang="en-US" dirty="0"/>
-          </a:p>
-        </p:txBody>
-      </p:sp>
-      <p:sp>
-        <p:nvSpPr>
-          <p:cNvPr id="4" name="내용 개체 틀 3"/>
-          <p:cNvSpPr>
-            <a:spLocks noGrp="1"/>
-          </p:cNvSpPr>
-          <p:nvPr>
-            <p:ph idx="1"/>
-          </p:nvPr>
-        </p:nvSpPr>
-        <p:spPr>
-          <a:xfrm>
-            <a:off x="179512" y="1124744"/>
-            <a:ext cx="7920000" cy="4525963"/>
-          </a:xfrm>
-        </p:spPr>
-        <p:txBody>
-          <a:bodyPr/>
-          <a:lstStyle/>
-          <a:p>
-            <a:r>
-              <a:rPr lang="en-US" altLang="ko-KR" dirty="0">
-                <a:hlinkClick r:id="rId3"/>
-              </a:rPr>
-              <a:t>http://10.110.243.90:9200/seunjeon-idx/_</a:t>
-            </a:r>
-            <a:r>
-              <a:rPr lang="en-US" altLang="ko-KR" dirty="0" smtClean="0">
-                <a:hlinkClick r:id="rId3"/>
-              </a:rPr>
-              <a:t>search?q=title</a:t>
-            </a:r>
-            <a:r>
-              <a:rPr lang="en-US" altLang="ko-KR" dirty="0" smtClean="0"/>
-              <a:t>:</a:t>
-            </a:r>
-            <a:r>
-              <a:rPr lang="ko-KR" altLang="en-US" dirty="0" smtClean="0"/>
-              <a:t>테스트</a:t>
-            </a:r>
-            <a:r>
-              <a:rPr lang="en-US" altLang="ko-KR" dirty="0" smtClean="0"/>
-              <a:t>%20</a:t>
-            </a:r>
-            <a:r>
-              <a:rPr lang="ko-KR" altLang="en-US" dirty="0" err="1" smtClean="0"/>
-              <a:t>정보글</a:t>
-            </a:r>
-            <a:r>
-              <a:rPr lang="en-US" altLang="ko-KR" dirty="0" smtClean="0"/>
-              <a:t>&amp;pretty=true</a:t>
+              <a:t>2. Elastic Search</a:t>
             </a:r>
             <a:endParaRPr lang="ko-KR" altLang="en-US" dirty="0"/>
           </a:p>
@@ -5788,14 +8223,14 @@
       </p:sp>
       <p:pic>
         <p:nvPicPr>
-          <p:cNvPr id="8198" name="Picture 6" descr="C:\Users\Naver.AL00039501\Desktop\1.png"/>
+          <p:cNvPr id="6146" name="Picture 2" descr="C:\Users\Naver.AL00039501\Desktop\캡처.jpg"/>
           <p:cNvPicPr>
             <a:picLocks noChangeAspect="1" noChangeArrowheads="1"/>
           </p:cNvPicPr>
           <p:nvPr/>
         </p:nvPicPr>
         <p:blipFill>
-          <a:blip r:embed="rId4">
+          <a:blip r:embed="rId3">
             <a:extLst>
               <a:ext uri="{28A0092B-C50C-407E-A947-70E740481C1C}">
                 <a14:useLocalDpi xmlns:a14="http://schemas.microsoft.com/office/drawing/2010/main" val="0"/>
@@ -5809,8 +8244,8 @@
         </p:blipFill>
         <p:spPr bwMode="auto">
           <a:xfrm>
-            <a:off x="299697" y="1484784"/>
-            <a:ext cx="2281237" cy="972880"/>
+            <a:off x="683568" y="2636912"/>
+            <a:ext cx="7810501" cy="2171700"/>
           </a:xfrm>
           <a:prstGeom prst="rect">
             <a:avLst/>
@@ -5827,335 +8262,10 @@
           </a:extLst>
         </p:spPr>
       </p:pic>
-      <p:pic>
-        <p:nvPicPr>
-          <p:cNvPr id="8199" name="Picture 7" descr="C:\Users\Naver.AL00039501\Desktop\2.png"/>
-          <p:cNvPicPr>
-            <a:picLocks noChangeAspect="1" noChangeArrowheads="1"/>
-          </p:cNvPicPr>
-          <p:nvPr/>
-        </p:nvPicPr>
-        <p:blipFill>
-          <a:blip r:embed="rId5">
-            <a:extLst>
-              <a:ext uri="{28A0092B-C50C-407E-A947-70E740481C1C}">
-                <a14:useLocalDpi xmlns:a14="http://schemas.microsoft.com/office/drawing/2010/main" val="0"/>
-              </a:ext>
-            </a:extLst>
-          </a:blip>
-          <a:srcRect/>
-          <a:stretch>
-            <a:fillRect/>
-          </a:stretch>
-        </p:blipFill>
-        <p:spPr bwMode="auto">
-          <a:xfrm>
-            <a:off x="179513" y="2698546"/>
-            <a:ext cx="4320480" cy="1100415"/>
-          </a:xfrm>
-          <a:prstGeom prst="rect">
-            <a:avLst/>
-          </a:prstGeom>
-          <a:noFill/>
-          <a:extLst>
-            <a:ext uri="{909E8E84-426E-40DD-AFC4-6F175D3DCCD1}">
-              <a14:hiddenFill xmlns:a14="http://schemas.microsoft.com/office/drawing/2010/main">
-                <a:solidFill>
-                  <a:srgbClr val="FFFFFF"/>
-                </a:solidFill>
-              </a14:hiddenFill>
-            </a:ext>
-          </a:extLst>
-        </p:spPr>
-      </p:pic>
-      <p:pic>
-        <p:nvPicPr>
-          <p:cNvPr id="8200" name="Picture 8" descr="C:\Users\Naver.AL00039501\Desktop\3.png"/>
-          <p:cNvPicPr>
-            <a:picLocks noChangeAspect="1" noChangeArrowheads="1"/>
-          </p:cNvPicPr>
-          <p:nvPr/>
-        </p:nvPicPr>
-        <p:blipFill>
-          <a:blip r:embed="rId6">
-            <a:extLst>
-              <a:ext uri="{28A0092B-C50C-407E-A947-70E740481C1C}">
-                <a14:useLocalDpi xmlns:a14="http://schemas.microsoft.com/office/drawing/2010/main" val="0"/>
-              </a:ext>
-            </a:extLst>
-          </a:blip>
-          <a:srcRect/>
-          <a:stretch>
-            <a:fillRect/>
-          </a:stretch>
-        </p:blipFill>
-        <p:spPr bwMode="auto">
-          <a:xfrm>
-            <a:off x="239605" y="4006419"/>
-            <a:ext cx="4200296" cy="1040863"/>
-          </a:xfrm>
-          <a:prstGeom prst="rect">
-            <a:avLst/>
-          </a:prstGeom>
-          <a:noFill/>
-          <a:extLst>
-            <a:ext uri="{909E8E84-426E-40DD-AFC4-6F175D3DCCD1}">
-              <a14:hiddenFill xmlns:a14="http://schemas.microsoft.com/office/drawing/2010/main">
-                <a:solidFill>
-                  <a:srgbClr val="FFFFFF"/>
-                </a:solidFill>
-              </a14:hiddenFill>
-            </a:ext>
-          </a:extLst>
-        </p:spPr>
-      </p:pic>
-      <p:pic>
-        <p:nvPicPr>
-          <p:cNvPr id="8201" name="Picture 9" descr="C:\Users\Naver.AL00039501\Desktop\4.png"/>
-          <p:cNvPicPr>
-            <a:picLocks noChangeAspect="1" noChangeArrowheads="1"/>
-          </p:cNvPicPr>
-          <p:nvPr/>
-        </p:nvPicPr>
-        <p:blipFill>
-          <a:blip r:embed="rId7">
-            <a:extLst>
-              <a:ext uri="{28A0092B-C50C-407E-A947-70E740481C1C}">
-                <a14:useLocalDpi xmlns:a14="http://schemas.microsoft.com/office/drawing/2010/main" val="0"/>
-              </a:ext>
-            </a:extLst>
-          </a:blip>
-          <a:srcRect/>
-          <a:stretch>
-            <a:fillRect/>
-          </a:stretch>
-        </p:blipFill>
-        <p:spPr bwMode="auto">
-          <a:xfrm>
-            <a:off x="299697" y="5229200"/>
-            <a:ext cx="2666801" cy="1228408"/>
-          </a:xfrm>
-          <a:prstGeom prst="rect">
-            <a:avLst/>
-          </a:prstGeom>
-          <a:noFill/>
-          <a:extLst>
-            <a:ext uri="{909E8E84-426E-40DD-AFC4-6F175D3DCCD1}">
-              <a14:hiddenFill xmlns:a14="http://schemas.microsoft.com/office/drawing/2010/main">
-                <a:solidFill>
-                  <a:srgbClr val="FFFFFF"/>
-                </a:solidFill>
-              </a14:hiddenFill>
-            </a:ext>
-          </a:extLst>
-        </p:spPr>
-      </p:pic>
-      <p:sp>
-        <p:nvSpPr>
-          <p:cNvPr id="14" name="내용 개체 틀 3"/>
-          <p:cNvSpPr txBox="1">
-            <a:spLocks/>
-          </p:cNvSpPr>
-          <p:nvPr/>
-        </p:nvSpPr>
-        <p:spPr>
-          <a:xfrm>
-            <a:off x="6012160" y="1484784"/>
-            <a:ext cx="3960000" cy="4525963"/>
-          </a:xfrm>
-          <a:prstGeom prst="rect">
-            <a:avLst/>
-          </a:prstGeom>
-        </p:spPr>
-        <p:txBody>
-          <a:bodyPr/>
-          <a:lstStyle>
-            <a:lvl1pPr marL="0" indent="0" algn="l" defTabSz="180000" rtl="0" eaLnBrk="1" latinLnBrk="1" hangingPunct="1">
-              <a:lnSpc>
-                <a:spcPct val="150000"/>
-              </a:lnSpc>
-              <a:spcBef>
-                <a:spcPts val="300"/>
-              </a:spcBef>
-              <a:buFontTx/>
-              <a:buNone/>
-              <a:tabLst>
-                <a:tab pos="180000" algn="l"/>
-              </a:tabLst>
-              <a:defRPr lang="ko-KR" altLang="en-US" sz="1000" b="0" i="0" kern="1200" spc="0" baseline="0" smtClean="0">
-                <a:solidFill>
-                  <a:schemeClr val="tx1"/>
-                </a:solidFill>
-                <a:latin typeface="+mn-lt"/>
-                <a:ea typeface="+mn-ea"/>
-                <a:cs typeface="+mn-cs"/>
-              </a:defRPr>
-            </a:lvl1pPr>
-            <a:lvl2pPr marL="180000" indent="-180000" algn="l" defTabSz="914400" rtl="0" eaLnBrk="1" latinLnBrk="1" hangingPunct="1">
-              <a:lnSpc>
-                <a:spcPct val="150000"/>
-              </a:lnSpc>
-              <a:spcBef>
-                <a:spcPts val="10"/>
-              </a:spcBef>
-              <a:buFont typeface="+mj-lt"/>
-              <a:buAutoNum type="arabicPeriod"/>
-              <a:defRPr sz="1000" b="0" i="0" kern="1200" spc="0">
-                <a:solidFill>
-                  <a:schemeClr val="tx1"/>
-                </a:solidFill>
-                <a:latin typeface="+mn-lt"/>
-                <a:ea typeface="+mn-ea"/>
-                <a:cs typeface="+mn-cs"/>
-              </a:defRPr>
-            </a:lvl2pPr>
-            <a:lvl3pPr marL="360000" indent="-180000" algn="l" defTabSz="914400" rtl="0" eaLnBrk="1" latinLnBrk="1" hangingPunct="1">
-              <a:lnSpc>
-                <a:spcPct val="150000"/>
-              </a:lnSpc>
-              <a:spcBef>
-                <a:spcPts val="10"/>
-              </a:spcBef>
-              <a:buFont typeface="+mj-lt"/>
-              <a:buAutoNum type="arabicParenR"/>
-              <a:defRPr sz="1000" kern="1200">
-                <a:solidFill>
-                  <a:schemeClr val="tx1"/>
-                </a:solidFill>
-                <a:latin typeface="+mn-lt"/>
-                <a:ea typeface="+mn-ea"/>
-                <a:cs typeface="+mn-cs"/>
-              </a:defRPr>
-            </a:lvl3pPr>
-            <a:lvl4pPr marL="648000" indent="-180000" algn="l" defTabSz="914400" rtl="0" eaLnBrk="1" latinLnBrk="1" hangingPunct="1">
-              <a:lnSpc>
-                <a:spcPct val="150000"/>
-              </a:lnSpc>
-              <a:spcBef>
-                <a:spcPts val="10"/>
-              </a:spcBef>
-              <a:buFont typeface="+mj-ea"/>
-              <a:buAutoNum type="circleNumDbPlain"/>
-              <a:defRPr sz="1000" b="0" i="0" kern="1200" spc="0">
-                <a:solidFill>
-                  <a:schemeClr val="tx1"/>
-                </a:solidFill>
-                <a:latin typeface="+mn-lt"/>
-                <a:ea typeface="+mn-ea"/>
-                <a:cs typeface="+mn-cs"/>
-              </a:defRPr>
-            </a:lvl4pPr>
-            <a:lvl5pPr marL="648000" indent="108000" algn="l" defTabSz="914400" rtl="0" eaLnBrk="1" latinLnBrk="1" hangingPunct="1">
-              <a:lnSpc>
-                <a:spcPct val="150000"/>
-              </a:lnSpc>
-              <a:spcBef>
-                <a:spcPts val="100"/>
-              </a:spcBef>
-              <a:buFont typeface="Arial" panose="020B0604020202020204" pitchFamily="34" charset="0"/>
-              <a:buChar char="•"/>
-              <a:defRPr sz="1000" kern="1200">
-                <a:solidFill>
-                  <a:schemeClr val="tx1"/>
-                </a:solidFill>
-                <a:latin typeface="+mn-lt"/>
-                <a:ea typeface="+mn-ea"/>
-                <a:cs typeface="+mn-cs"/>
-              </a:defRPr>
-            </a:lvl5pPr>
-            <a:lvl6pPr marL="900000" indent="0" algn="l" defTabSz="914400" rtl="0" eaLnBrk="1" latinLnBrk="1" hangingPunct="1">
-              <a:lnSpc>
-                <a:spcPct val="150000"/>
-              </a:lnSpc>
-              <a:spcBef>
-                <a:spcPts val="10"/>
-              </a:spcBef>
-              <a:buFontTx/>
-              <a:buNone/>
-              <a:defRPr sz="1000" kern="1200">
-                <a:solidFill>
-                  <a:schemeClr val="tx1"/>
-                </a:solidFill>
-                <a:latin typeface="+mn-lt"/>
-                <a:ea typeface="+mn-ea"/>
-                <a:cs typeface="+mn-cs"/>
-              </a:defRPr>
-            </a:lvl6pPr>
-            <a:lvl7pPr marL="2971800" indent="-228600" algn="l" defTabSz="914400" rtl="0" eaLnBrk="1" latinLnBrk="1" hangingPunct="1">
-              <a:spcBef>
-                <a:spcPct val="20000"/>
-              </a:spcBef>
-              <a:buFont typeface="Arial" panose="020B0604020202020204" pitchFamily="34" charset="0"/>
-              <a:buChar char="•"/>
-              <a:defRPr sz="2000" kern="1200">
-                <a:solidFill>
-                  <a:schemeClr val="tx1"/>
-                </a:solidFill>
-                <a:latin typeface="+mn-lt"/>
-                <a:ea typeface="+mn-ea"/>
-                <a:cs typeface="+mn-cs"/>
-              </a:defRPr>
-            </a:lvl7pPr>
-            <a:lvl8pPr marL="3429000" indent="-228600" algn="l" defTabSz="914400" rtl="0" eaLnBrk="1" latinLnBrk="1" hangingPunct="1">
-              <a:spcBef>
-                <a:spcPct val="20000"/>
-              </a:spcBef>
-              <a:buFont typeface="Arial" panose="020B0604020202020204" pitchFamily="34" charset="0"/>
-              <a:buChar char="•"/>
-              <a:defRPr sz="2000" kern="1200">
-                <a:solidFill>
-                  <a:schemeClr val="tx1"/>
-                </a:solidFill>
-                <a:latin typeface="+mn-lt"/>
-                <a:ea typeface="+mn-ea"/>
-                <a:cs typeface="+mn-cs"/>
-              </a:defRPr>
-            </a:lvl8pPr>
-            <a:lvl9pPr marL="3886200" indent="-228600" algn="l" defTabSz="914400" rtl="0" eaLnBrk="1" latinLnBrk="1" hangingPunct="1">
-              <a:spcBef>
-                <a:spcPct val="20000"/>
-              </a:spcBef>
-              <a:buFont typeface="Arial" panose="020B0604020202020204" pitchFamily="34" charset="0"/>
-              <a:buChar char="•"/>
-              <a:defRPr sz="2000" kern="1200">
-                <a:solidFill>
-                  <a:schemeClr val="tx1"/>
-                </a:solidFill>
-                <a:latin typeface="+mn-lt"/>
-                <a:ea typeface="+mn-ea"/>
-                <a:cs typeface="+mn-cs"/>
-              </a:defRPr>
-            </a:lvl9pPr>
-          </a:lstStyle>
-          <a:p>
-            <a:pPr marL="171450" indent="-171450">
-              <a:buFont typeface="Arial" panose="020B0604020202020204" pitchFamily="34" charset="0"/>
-              <a:buChar char="•"/>
-            </a:pPr>
-            <a:r>
-              <a:rPr lang="ko-KR" altLang="en-US" dirty="0" err="1" smtClean="0"/>
-              <a:t>문서안의</a:t>
-            </a:r>
-            <a:r>
-              <a:rPr lang="ko-KR" altLang="en-US" dirty="0" smtClean="0"/>
-              <a:t> 단어의 빈도에 따라 </a:t>
-            </a:r>
-            <a:r>
-              <a:rPr lang="en-US" altLang="ko-KR" dirty="0" smtClean="0"/>
-              <a:t>score</a:t>
-            </a:r>
-            <a:r>
-              <a:rPr lang="ko-KR" altLang="en-US" dirty="0" smtClean="0"/>
-              <a:t>를 결정</a:t>
-            </a:r>
-            <a:endParaRPr lang="en-US" dirty="0"/>
-          </a:p>
-        </p:txBody>
-      </p:sp>
     </p:spTree>
     <p:extLst>
       <p:ext uri="{BB962C8B-B14F-4D97-AF65-F5344CB8AC3E}">
-        <p14:creationId xmlns:p14="http://schemas.microsoft.com/office/powerpoint/2010/main" val="1163035718"/>
+        <p14:creationId xmlns:p14="http://schemas.microsoft.com/office/powerpoint/2010/main" val="1238717547"/>
       </p:ext>
     </p:extLst>
   </p:cSld>
@@ -6202,7 +8312,7 @@
         <p:spPr>
           <a:xfrm>
             <a:off x="252000" y="298748"/>
-            <a:ext cx="8640000" cy="338554"/>
+            <a:ext cx="8640000" cy="584775"/>
           </a:xfrm>
         </p:spPr>
         <p:txBody>
@@ -6214,15 +8324,112 @@
             </a:pPr>
             <a:r>
               <a:rPr lang="en-US" altLang="ko-KR" dirty="0" smtClean="0"/>
-              <a:t>3. </a:t>
-            </a:r>
-            <a:r>
-              <a:rPr lang="en-US" altLang="ko-KR" dirty="0" err="1" smtClean="0"/>
-              <a:t>Mysql</a:t>
+              <a:t>2. Elastic Search – </a:t>
+            </a:r>
+            <a:r>
+              <a:rPr lang="ko-KR" altLang="en-US" dirty="0" smtClean="0"/>
+              <a:t>형태소 분석 은전 </a:t>
+            </a:r>
+            <a:r>
+              <a:rPr lang="ko-KR" altLang="en-US" dirty="0" err="1" smtClean="0"/>
+              <a:t>한닢</a:t>
             </a:r>
             <a:r>
               <a:rPr lang="en-US" altLang="ko-KR" dirty="0" smtClean="0"/>
-              <a:t> To Elastic</a:t>
+              <a:t/>
+            </a:r>
+            <a:br>
+              <a:rPr lang="en-US" altLang="ko-KR" dirty="0" smtClean="0"/>
+            </a:br>
+            <a:endParaRPr lang="ko-KR" altLang="en-US" dirty="0"/>
+          </a:p>
+        </p:txBody>
+      </p:sp>
+      <p:sp>
+        <p:nvSpPr>
+          <p:cNvPr id="4" name="내용 개체 틀 3"/>
+          <p:cNvSpPr>
+            <a:spLocks noGrp="1"/>
+          </p:cNvSpPr>
+          <p:nvPr>
+            <p:ph idx="1"/>
+          </p:nvPr>
+        </p:nvSpPr>
+        <p:spPr>
+          <a:xfrm>
+            <a:off x="179512" y="1124744"/>
+            <a:ext cx="7920000" cy="4525963"/>
+          </a:xfrm>
+        </p:spPr>
+        <p:txBody>
+          <a:bodyPr/>
+          <a:lstStyle/>
+          <a:p>
+            <a:r>
+              <a:rPr lang="en-US" altLang="ko-KR" dirty="0">
+                <a:hlinkClick r:id="rId3"/>
+              </a:rPr>
+              <a:t>http://10.110.243.90:9200/seunjeon-idx/_</a:t>
+            </a:r>
+            <a:r>
+              <a:rPr lang="en-US" altLang="ko-KR" dirty="0" smtClean="0">
+                <a:hlinkClick r:id="rId3"/>
+              </a:rPr>
+              <a:t>analyze?analyzer=korean&amp;pretty=true&amp;text=</a:t>
+            </a:r>
+            <a:r>
+              <a:rPr lang="ko-KR" altLang="en-US" dirty="0" smtClean="0">
+                <a:hlinkClick r:id="rId3"/>
+              </a:rPr>
+              <a:t>안녕</a:t>
+            </a:r>
+            <a:r>
+              <a:rPr lang="en-US" altLang="ko-KR" dirty="0" smtClean="0">
+                <a:hlinkClick r:id="rId3"/>
+              </a:rPr>
+              <a:t>%20</a:t>
+            </a:r>
+            <a:r>
+              <a:rPr lang="ko-KR" altLang="en-US" dirty="0" smtClean="0">
+                <a:hlinkClick r:id="rId3"/>
+              </a:rPr>
+              <a:t>하세요</a:t>
+            </a:r>
+            <a:r>
+              <a:rPr lang="en-US" altLang="ko-KR" dirty="0" smtClean="0">
+                <a:hlinkClick r:id="rId3"/>
+              </a:rPr>
+              <a:t>%20</a:t>
+            </a:r>
+            <a:r>
+              <a:rPr lang="ko-KR" altLang="en-US" dirty="0" smtClean="0">
+                <a:hlinkClick r:id="rId3"/>
+              </a:rPr>
+              <a:t>오늘</a:t>
+            </a:r>
+            <a:r>
+              <a:rPr lang="en-US" altLang="ko-KR" dirty="0" smtClean="0">
+                <a:hlinkClick r:id="rId3"/>
+              </a:rPr>
+              <a:t>%20</a:t>
+            </a:r>
+            <a:r>
+              <a:rPr lang="ko-KR" altLang="en-US" dirty="0" smtClean="0">
+                <a:hlinkClick r:id="rId3"/>
+              </a:rPr>
+              <a:t>날씨가</a:t>
+            </a:r>
+            <a:r>
+              <a:rPr lang="en-US" altLang="ko-KR" dirty="0" smtClean="0">
+                <a:hlinkClick r:id="rId3"/>
+              </a:rPr>
+              <a:t>%20</a:t>
+            </a:r>
+            <a:r>
+              <a:rPr lang="ko-KR" altLang="en-US" dirty="0" smtClean="0">
+                <a:hlinkClick r:id="rId3"/>
+              </a:rPr>
+              <a:t>좋네요</a:t>
             </a:r>
             <a:endParaRPr lang="ko-KR" altLang="en-US" dirty="0"/>
           </a:p>
@@ -6230,14 +8437,14 @@
       </p:sp>
       <p:pic>
         <p:nvPicPr>
-          <p:cNvPr id="6146" name="Picture 2" descr="C:\Users\Naver.AL00039501\Desktop\캡처.jpg"/>
+          <p:cNvPr id="7170" name="Picture 2" descr="C:\Users\Naver.AL00039501\Desktop\인덱싱.png"/>
           <p:cNvPicPr>
             <a:picLocks noChangeAspect="1" noChangeArrowheads="1"/>
           </p:cNvPicPr>
           <p:nvPr/>
         </p:nvPicPr>
         <p:blipFill>
-          <a:blip r:embed="rId3">
+          <a:blip r:embed="rId4">
             <a:extLst>
               <a:ext uri="{28A0092B-C50C-407E-A947-70E740481C1C}">
                 <a14:useLocalDpi xmlns:a14="http://schemas.microsoft.com/office/drawing/2010/main" val="0"/>
@@ -6251,8 +8458,8 @@
         </p:blipFill>
         <p:spPr bwMode="auto">
           <a:xfrm>
-            <a:off x="683568" y="2636912"/>
-            <a:ext cx="7810501" cy="2171700"/>
+            <a:off x="2411760" y="1412776"/>
+            <a:ext cx="1498718" cy="5296442"/>
           </a:xfrm>
           <a:prstGeom prst="rect">
             <a:avLst/>
@@ -6269,10 +8476,51 @@
           </a:extLst>
         </p:spPr>
       </p:pic>
+      <p:pic>
+        <p:nvPicPr>
+          <p:cNvPr id="5" name="Picture 2" descr="C:\Users\Naver.AL00039501\Desktop\은전 한닢.png"/>
+          <p:cNvPicPr>
+            <a:picLocks noChangeAspect="1" noChangeArrowheads="1"/>
+          </p:cNvPicPr>
+          <p:nvPr/>
+        </p:nvPicPr>
+        <p:blipFill>
+          <a:blip r:embed="rId5">
+            <a:extLst>
+              <a:ext uri="{28A0092B-C50C-407E-A947-70E740481C1C}">
+                <a14:useLocalDpi xmlns:a14="http://schemas.microsoft.com/office/drawing/2010/main" val="0"/>
+              </a:ext>
+            </a:extLst>
+          </a:blip>
+          <a:srcRect/>
+          <a:stretch>
+            <a:fillRect/>
+          </a:stretch>
+        </p:blipFill>
+        <p:spPr bwMode="auto">
+          <a:xfrm>
+            <a:off x="5220072" y="2924944"/>
+            <a:ext cx="3692196" cy="1465337"/>
+          </a:xfrm>
+          <a:prstGeom prst="rect">
+            <a:avLst/>
+          </a:prstGeom>
+          <a:noFill/>
+          <a:extLst>
+            <a:ext uri="{909E8E84-426E-40DD-AFC4-6F175D3DCCD1}">
+              <a14:hiddenFill xmlns:a14="http://schemas.microsoft.com/office/drawing/2010/main">
+                <a:solidFill>
+                  <a:srgbClr val="FFFFFF"/>
+                </a:solidFill>
+              </a14:hiddenFill>
+            </a:ext>
+          </a:extLst>
+        </p:spPr>
+      </p:pic>
     </p:spTree>
     <p:extLst>
       <p:ext uri="{BB962C8B-B14F-4D97-AF65-F5344CB8AC3E}">
-        <p14:creationId xmlns:p14="http://schemas.microsoft.com/office/powerpoint/2010/main" val="3328129697"/>
+        <p14:creationId xmlns:p14="http://schemas.microsoft.com/office/powerpoint/2010/main" val="770855262"/>
       </p:ext>
     </p:extLst>
   </p:cSld>
@@ -6331,65 +8579,264 @@
             </a:pPr>
             <a:r>
               <a:rPr lang="en-US" altLang="ko-KR" dirty="0" smtClean="0"/>
-              <a:t>3. </a:t>
-            </a:r>
-            <a:r>
-              <a:rPr lang="ko-KR" altLang="en-US" dirty="0" smtClean="0"/>
-              <a:t>은전 </a:t>
-            </a:r>
-            <a:r>
-              <a:rPr lang="ko-KR" altLang="en-US" dirty="0" err="1" smtClean="0"/>
-              <a:t>한닢</a:t>
+              <a:t>2. Elastic Search – ranking</a:t>
             </a:r>
             <a:endParaRPr lang="ko-KR" altLang="en-US" dirty="0"/>
           </a:p>
         </p:txBody>
       </p:sp>
-      <p:pic>
-        <p:nvPicPr>
-          <p:cNvPr id="9218" name="Picture 2" descr="C:\Users\Naver.AL00039501\Desktop\은전 한닢.png"/>
-          <p:cNvPicPr>
-            <a:picLocks noChangeAspect="1" noChangeArrowheads="1"/>
-          </p:cNvPicPr>
-          <p:nvPr/>
-        </p:nvPicPr>
-        <p:blipFill>
-          <a:blip r:embed="rId3">
-            <a:extLst>
-              <a:ext uri="{28A0092B-C50C-407E-A947-70E740481C1C}">
-                <a14:useLocalDpi xmlns:a14="http://schemas.microsoft.com/office/drawing/2010/main" val="0"/>
-              </a:ext>
-            </a:extLst>
-          </a:blip>
-          <a:srcRect/>
-          <a:stretch>
-            <a:fillRect/>
-          </a:stretch>
-        </p:blipFill>
-        <p:spPr bwMode="auto">
-          <a:xfrm>
-            <a:off x="1691680" y="2492896"/>
-            <a:ext cx="5688013" cy="2257425"/>
-          </a:xfrm>
-          <a:prstGeom prst="rect">
-            <a:avLst/>
-          </a:prstGeom>
-          <a:noFill/>
-          <a:extLst>
-            <a:ext uri="{909E8E84-426E-40DD-AFC4-6F175D3DCCD1}">
-              <a14:hiddenFill xmlns:a14="http://schemas.microsoft.com/office/drawing/2010/main">
-                <a:solidFill>
-                  <a:srgbClr val="FFFFFF"/>
-                </a:solidFill>
-              </a14:hiddenFill>
-            </a:ext>
-          </a:extLst>
-        </p:spPr>
-      </p:pic>
+      <p:sp>
+        <p:nvSpPr>
+          <p:cNvPr id="3" name="내용 개체 틀 2"/>
+          <p:cNvSpPr>
+            <a:spLocks noGrp="1"/>
+          </p:cNvSpPr>
+          <p:nvPr>
+            <p:ph idx="1"/>
+          </p:nvPr>
+        </p:nvSpPr>
+        <p:spPr/>
+        <p:txBody>
+          <a:bodyPr/>
+          <a:lstStyle/>
+          <a:p>
+            <a:pPr marL="171450" indent="-171450">
+              <a:buFont typeface="Arial" panose="020B0604020202020204" pitchFamily="34" charset="0"/>
+              <a:buChar char="•"/>
+            </a:pPr>
+            <a:r>
+              <a:rPr lang="ko-KR" altLang="en-US" sz="1600" dirty="0" err="1" smtClean="0"/>
+              <a:t>불리언</a:t>
+            </a:r>
+            <a:r>
+              <a:rPr lang="ko-KR" altLang="en-US" sz="1600" dirty="0" smtClean="0"/>
+              <a:t> 검색 모델 </a:t>
+            </a:r>
+            <a:r>
+              <a:rPr lang="en-US" altLang="ko-KR" sz="1600" dirty="0" smtClean="0"/>
+              <a:t>: </a:t>
+            </a:r>
+            <a:r>
+              <a:rPr lang="ko-KR" altLang="en-US" sz="1600" dirty="0" smtClean="0"/>
+              <a:t>주어진 단어의 존재 유무 차이</a:t>
+            </a:r>
+            <a:r>
+              <a:rPr lang="en-US" altLang="ko-KR" sz="1600" dirty="0" smtClean="0"/>
+              <a:t>.  (</a:t>
+            </a:r>
+            <a:r>
+              <a:rPr lang="ko-KR" altLang="en-US" sz="1600" dirty="0" smtClean="0"/>
+              <a:t>법 판례 검색</a:t>
+            </a:r>
+            <a:r>
+              <a:rPr lang="en-US" altLang="ko-KR" sz="1600" dirty="0" smtClean="0"/>
+              <a:t>)</a:t>
+            </a:r>
+          </a:p>
+          <a:p>
+            <a:pPr marL="171450" indent="-171450">
+              <a:buFont typeface="Arial" panose="020B0604020202020204" pitchFamily="34" charset="0"/>
+              <a:buChar char="•"/>
+            </a:pPr>
+            <a:r>
+              <a:rPr lang="ko-KR" altLang="en-US" sz="1600" dirty="0" smtClean="0"/>
+              <a:t>확률 기반 모델 </a:t>
+            </a:r>
+            <a:r>
+              <a:rPr lang="en-US" altLang="ko-KR" sz="1600" dirty="0" smtClean="0"/>
+              <a:t>: </a:t>
+            </a:r>
+            <a:r>
+              <a:rPr lang="ko-KR" altLang="en-US" sz="1600" dirty="0" smtClean="0"/>
+              <a:t>주어진 단어가 적합한 문서에 있을 확률</a:t>
+            </a:r>
+            <a:r>
+              <a:rPr lang="en-US" altLang="ko-KR" sz="1600" dirty="0" smtClean="0"/>
+              <a:t>. </a:t>
+            </a:r>
+          </a:p>
+          <a:p>
+            <a:pPr marL="351450" lvl="1" indent="-171450">
+              <a:buFont typeface="Arial" panose="020B0604020202020204" pitchFamily="34" charset="0"/>
+              <a:buChar char="•"/>
+            </a:pPr>
+            <a:r>
+              <a:rPr lang="ko-KR" altLang="en-US" sz="1600" dirty="0" smtClean="0"/>
+              <a:t>적합한 문서라는 정보 필요</a:t>
+            </a:r>
+            <a:r>
+              <a:rPr lang="en-US" altLang="ko-KR" sz="1600" dirty="0" smtClean="0"/>
+              <a:t>, </a:t>
+            </a:r>
+            <a:r>
+              <a:rPr lang="ko-KR" altLang="en-US" sz="1600" dirty="0" smtClean="0"/>
+              <a:t>학회에서 사용</a:t>
+            </a:r>
+            <a:endParaRPr lang="en-US" altLang="ko-KR" sz="1600" dirty="0" smtClean="0"/>
+          </a:p>
+          <a:p>
+            <a:pPr marL="171450" indent="-171450">
+              <a:buFont typeface="Arial" panose="020B0604020202020204" pitchFamily="34" charset="0"/>
+              <a:buChar char="•"/>
+            </a:pPr>
+            <a:r>
+              <a:rPr lang="ko-KR" altLang="en-US" sz="1600" dirty="0" smtClean="0"/>
+              <a:t>벡터 공간 모델 </a:t>
+            </a:r>
+            <a:r>
+              <a:rPr lang="en-US" altLang="ko-KR" sz="1600" dirty="0" smtClean="0"/>
+              <a:t>: Elastic Search </a:t>
+            </a:r>
+            <a:r>
+              <a:rPr lang="ko-KR" altLang="en-US" sz="1600" dirty="0" smtClean="0"/>
+              <a:t>에서 사용하는 모델</a:t>
+            </a:r>
+            <a:r>
+              <a:rPr lang="en-US" altLang="ko-KR" sz="1600" dirty="0" smtClean="0"/>
+              <a:t>.</a:t>
+            </a:r>
+          </a:p>
+          <a:p>
+            <a:pPr marL="351450" lvl="1" indent="-171450">
+              <a:buFont typeface="Arial" panose="020B0604020202020204" pitchFamily="34" charset="0"/>
+              <a:buChar char="•"/>
+            </a:pPr>
+            <a:r>
+              <a:rPr lang="ko-KR" altLang="en-US" sz="1600" dirty="0" smtClean="0"/>
+              <a:t>주어진 단어의 존재 유무에 따라 가중치를 결정</a:t>
+            </a:r>
+            <a:r>
+              <a:rPr lang="en-US" altLang="ko-KR" sz="1600" dirty="0" smtClean="0"/>
+              <a:t>.</a:t>
+            </a:r>
+          </a:p>
+          <a:p>
+            <a:pPr marL="351450" lvl="1" indent="-171450">
+              <a:buFont typeface="Arial" panose="020B0604020202020204" pitchFamily="34" charset="0"/>
+              <a:buChar char="•"/>
+            </a:pPr>
+            <a:r>
+              <a:rPr lang="ko-KR" altLang="en-US" sz="1600" dirty="0" smtClean="0"/>
+              <a:t>단어의 부분 일치도 고려 가능</a:t>
+            </a:r>
+            <a:r>
+              <a:rPr lang="en-US" altLang="ko-KR" sz="1600" dirty="0" smtClean="0"/>
+              <a:t>.</a:t>
+            </a:r>
+          </a:p>
+          <a:p>
+            <a:pPr marL="351450" lvl="1" indent="-171450">
+              <a:buFont typeface="Arial" panose="020B0604020202020204" pitchFamily="34" charset="0"/>
+              <a:buChar char="•"/>
+            </a:pPr>
+            <a:r>
+              <a:rPr lang="ko-KR" altLang="en-US" sz="1600" dirty="0" smtClean="0"/>
+              <a:t>단점 </a:t>
+            </a:r>
+            <a:r>
+              <a:rPr lang="en-US" altLang="ko-KR" sz="1600" dirty="0" smtClean="0"/>
+              <a:t>: </a:t>
+            </a:r>
+            <a:r>
+              <a:rPr lang="ko-KR" altLang="en-US" sz="1600" dirty="0" smtClean="0"/>
+              <a:t>단어가 서로 독립적으로 존재 가정</a:t>
+            </a:r>
+            <a:r>
+              <a:rPr lang="en-US" altLang="ko-KR" sz="1600" dirty="0" smtClean="0"/>
+              <a:t>. </a:t>
+            </a:r>
+          </a:p>
+          <a:p>
+            <a:pPr marL="531450" lvl="2" indent="-171450">
+              <a:buFont typeface="Arial" panose="020B0604020202020204" pitchFamily="34" charset="0"/>
+              <a:buChar char="•"/>
+            </a:pPr>
+            <a:r>
+              <a:rPr lang="ko-KR" altLang="en-US" sz="1600" dirty="0" smtClean="0"/>
+              <a:t>유의어</a:t>
+            </a:r>
+            <a:r>
+              <a:rPr lang="en-US" altLang="ko-KR" sz="1600" dirty="0" smtClean="0"/>
+              <a:t>, </a:t>
+            </a:r>
+            <a:r>
+              <a:rPr lang="ko-KR" altLang="en-US" sz="1600" dirty="0" err="1" smtClean="0"/>
+              <a:t>두개</a:t>
+            </a:r>
+            <a:r>
+              <a:rPr lang="ko-KR" altLang="en-US" sz="1600" dirty="0" smtClean="0"/>
+              <a:t> 이상의 단어가 들어간 합성어 구분 불가</a:t>
+            </a:r>
+            <a:r>
+              <a:rPr lang="en-US" altLang="ko-KR" sz="1600" dirty="0" smtClean="0"/>
+              <a:t>.</a:t>
+            </a:r>
+          </a:p>
+          <a:p>
+            <a:pPr marL="531450" lvl="2" indent="-171450">
+              <a:buFont typeface="Arial" panose="020B0604020202020204" pitchFamily="34" charset="0"/>
+              <a:buChar char="•"/>
+            </a:pPr>
+            <a:r>
+              <a:rPr lang="ko-KR" altLang="en-US" sz="1600" dirty="0" smtClean="0"/>
+              <a:t>길이가 긴 문서는</a:t>
+            </a:r>
+            <a:r>
+              <a:rPr lang="en-US" altLang="ko-KR" sz="1600" dirty="0" smtClean="0"/>
+              <a:t>,</a:t>
+            </a:r>
+            <a:r>
+              <a:rPr lang="ko-KR" altLang="en-US" sz="1600" dirty="0" smtClean="0"/>
+              <a:t>표현이 어렵다</a:t>
+            </a:r>
+            <a:r>
+              <a:rPr lang="en-US" altLang="ko-KR" sz="1600" dirty="0" smtClean="0"/>
+              <a:t>. (</a:t>
+            </a:r>
+            <a:r>
+              <a:rPr lang="ko-KR" altLang="en-US" sz="1600" dirty="0" smtClean="0"/>
+              <a:t>작은 스칼라</a:t>
+            </a:r>
+            <a:r>
+              <a:rPr lang="en-US" altLang="ko-KR" sz="1600" dirty="0" smtClean="0"/>
+              <a:t>, </a:t>
+            </a:r>
+            <a:r>
+              <a:rPr lang="ko-KR" altLang="en-US" sz="1600" dirty="0" smtClean="0"/>
+              <a:t>높은 차원</a:t>
+            </a:r>
+            <a:r>
+              <a:rPr lang="en-US" altLang="ko-KR" sz="1600" dirty="0" smtClean="0"/>
+              <a:t>)</a:t>
+            </a:r>
+          </a:p>
+          <a:p>
+            <a:pPr marL="171450" indent="-171450">
+              <a:buFont typeface="Arial" panose="020B0604020202020204" pitchFamily="34" charset="0"/>
+              <a:buChar char="•"/>
+            </a:pPr>
+            <a:endParaRPr lang="en-US" altLang="ko-KR" sz="1600" dirty="0" smtClean="0"/>
+          </a:p>
+          <a:p>
+            <a:pPr marL="171450" indent="-171450">
+              <a:buFont typeface="Arial" panose="020B0604020202020204" pitchFamily="34" charset="0"/>
+              <a:buChar char="•"/>
+            </a:pPr>
+            <a:endParaRPr lang="en-US" altLang="ko-KR" sz="2400" dirty="0" smtClean="0"/>
+          </a:p>
+          <a:p>
+            <a:r>
+              <a:rPr lang="en-US" altLang="ko-KR" sz="2400" dirty="0"/>
+              <a:t>	</a:t>
+            </a:r>
+            <a:endParaRPr lang="ko-KR" altLang="en-US" dirty="0"/>
+          </a:p>
+        </p:txBody>
+      </p:sp>
     </p:spTree>
     <p:extLst>
       <p:ext uri="{BB962C8B-B14F-4D97-AF65-F5344CB8AC3E}">
-        <p14:creationId xmlns:p14="http://schemas.microsoft.com/office/powerpoint/2010/main" val="1789697785"/>
+        <p14:creationId xmlns:p14="http://schemas.microsoft.com/office/powerpoint/2010/main" val="1422826209"/>
       </p:ext>
     </p:extLst>
   </p:cSld>
@@ -6433,31 +8880,392 @@
             <p:ph type="title"/>
           </p:nvPr>
         </p:nvSpPr>
-        <p:spPr/>
+        <p:spPr>
+          <a:xfrm>
+            <a:off x="252000" y="298748"/>
+            <a:ext cx="8640000" cy="338554"/>
+          </a:xfrm>
+        </p:spPr>
         <p:txBody>
-          <a:bodyPr>
-            <a:noAutofit/>
-          </a:bodyPr>
+          <a:bodyPr/>
           <a:lstStyle/>
           <a:p>
-            <a:r>
-              <a:rPr lang="en-US" altLang="ko-KR" sz="4500" dirty="0" smtClean="0">
-                <a:latin typeface="+mj-ea"/>
-                <a:ea typeface="+mj-ea"/>
-              </a:rPr>
-              <a:t>End of Document</a:t>
-            </a:r>
-            <a:endParaRPr lang="ko-KR" altLang="en-US" sz="4500" dirty="0">
-              <a:latin typeface="+mj-ea"/>
-              <a:ea typeface="+mj-ea"/>
-            </a:endParaRPr>
+            <a:pPr>
+              <a:defRPr/>
+            </a:pPr>
+            <a:r>
+              <a:rPr lang="en-US" altLang="ko-KR" dirty="0" smtClean="0"/>
+              <a:t>2. Elastic Search – </a:t>
+            </a:r>
+            <a:r>
+              <a:rPr lang="ko-KR" altLang="en-US" dirty="0" err="1" smtClean="0"/>
+              <a:t>역색</a:t>
+            </a:r>
+            <a:r>
+              <a:rPr lang="ko-KR" altLang="en-US" dirty="0" err="1"/>
+              <a:t>인</a:t>
+            </a:r>
+            <a:endParaRPr lang="ko-KR" altLang="en-US" dirty="0"/>
           </a:p>
         </p:txBody>
       </p:sp>
+      <p:pic>
+        <p:nvPicPr>
+          <p:cNvPr id="3074" name="Picture 2" descr="C:\Users\Naver.AL00039501\Desktop\inverted index.png"/>
+          <p:cNvPicPr>
+            <a:picLocks noChangeAspect="1" noChangeArrowheads="1"/>
+          </p:cNvPicPr>
+          <p:nvPr/>
+        </p:nvPicPr>
+        <p:blipFill>
+          <a:blip r:embed="rId3">
+            <a:extLst>
+              <a:ext uri="{28A0092B-C50C-407E-A947-70E740481C1C}">
+                <a14:useLocalDpi xmlns:a14="http://schemas.microsoft.com/office/drawing/2010/main" val="0"/>
+              </a:ext>
+            </a:extLst>
+          </a:blip>
+          <a:srcRect/>
+          <a:stretch>
+            <a:fillRect/>
+          </a:stretch>
+        </p:blipFill>
+        <p:spPr bwMode="auto">
+          <a:xfrm>
+            <a:off x="1654174" y="1042768"/>
+            <a:ext cx="5582122" cy="5659806"/>
+          </a:xfrm>
+          <a:prstGeom prst="rect">
+            <a:avLst/>
+          </a:prstGeom>
+          <a:noFill/>
+          <a:extLst>
+            <a:ext uri="{909E8E84-426E-40DD-AFC4-6F175D3DCCD1}">
+              <a14:hiddenFill xmlns:a14="http://schemas.microsoft.com/office/drawing/2010/main">
+                <a:solidFill>
+                  <a:srgbClr val="FFFFFF"/>
+                </a:solidFill>
+              </a14:hiddenFill>
+            </a:ext>
+          </a:extLst>
+        </p:spPr>
+      </p:pic>
     </p:spTree>
     <p:extLst>
       <p:ext uri="{BB962C8B-B14F-4D97-AF65-F5344CB8AC3E}">
-        <p14:creationId xmlns:p14="http://schemas.microsoft.com/office/powerpoint/2010/main" val="4157591422"/>
+        <p14:creationId xmlns:p14="http://schemas.microsoft.com/office/powerpoint/2010/main" val="3653617468"/>
+      </p:ext>
+    </p:extLst>
+  </p:cSld>
+  <p:clrMapOvr>
+    <a:masterClrMapping/>
+  </p:clrMapOvr>
+  <p:timing>
+    <p:tnLst>
+      <p:par>
+        <p:cTn id="1" dur="indefinite" restart="never" nodeType="tmRoot"/>
+      </p:par>
+    </p:tnLst>
+  </p:timing>
+</p:sld>
+</file>
+
+<file path=ppt/slides/slide9.xml><?xml version="1.0" encoding="utf-8"?>
+<p:sld xmlns:a="http://schemas.openxmlformats.org/drawingml/2006/main" xmlns:r="http://schemas.openxmlformats.org/officeDocument/2006/relationships" xmlns:p="http://schemas.openxmlformats.org/presentationml/2006/main">
+  <p:cSld>
+    <p:spTree>
+      <p:nvGrpSpPr>
+        <p:cNvPr id="1" name=""/>
+        <p:cNvGrpSpPr/>
+        <p:nvPr/>
+      </p:nvGrpSpPr>
+      <p:grpSpPr>
+        <a:xfrm>
+          <a:off x="0" y="0"/>
+          <a:ext cx="0" cy="0"/>
+          <a:chOff x="0" y="0"/>
+          <a:chExt cx="0" cy="0"/>
+        </a:xfrm>
+      </p:grpSpPr>
+      <p:sp>
+        <p:nvSpPr>
+          <p:cNvPr id="2" name="제목 1"/>
+          <p:cNvSpPr>
+            <a:spLocks noGrp="1"/>
+          </p:cNvSpPr>
+          <p:nvPr>
+            <p:ph type="title"/>
+          </p:nvPr>
+        </p:nvSpPr>
+        <p:spPr>
+          <a:xfrm>
+            <a:off x="252000" y="298748"/>
+            <a:ext cx="8640000" cy="338554"/>
+          </a:xfrm>
+        </p:spPr>
+        <p:txBody>
+          <a:bodyPr/>
+          <a:lstStyle/>
+          <a:p>
+            <a:pPr>
+              <a:defRPr/>
+            </a:pPr>
+            <a:r>
+              <a:rPr lang="en-US" altLang="ko-KR" dirty="0" smtClean="0"/>
+              <a:t>2. Elastic Search – TF-IDF </a:t>
+            </a:r>
+            <a:r>
+              <a:rPr lang="ko-KR" altLang="en-US" dirty="0" smtClean="0"/>
+              <a:t>가중치</a:t>
+            </a:r>
+            <a:endParaRPr lang="ko-KR" altLang="en-US" dirty="0"/>
+          </a:p>
+        </p:txBody>
+      </p:sp>
+      <p:pic>
+        <p:nvPicPr>
+          <p:cNvPr id="2050" name="Picture 2" descr="C:\Users\Naver.AL00039501\Desktop\761706fd22a01ae6887126b6ec1d67004c8a325b.png"/>
+          <p:cNvPicPr>
+            <a:picLocks noChangeAspect="1" noChangeArrowheads="1"/>
+          </p:cNvPicPr>
+          <p:nvPr/>
+        </p:nvPicPr>
+        <p:blipFill>
+          <a:blip r:embed="rId3">
+            <a:extLst>
+              <a:ext uri="{28A0092B-C50C-407E-A947-70E740481C1C}">
+                <a14:useLocalDpi xmlns:a14="http://schemas.microsoft.com/office/drawing/2010/main" val="0"/>
+              </a:ext>
+            </a:extLst>
+          </a:blip>
+          <a:srcRect/>
+          <a:stretch>
+            <a:fillRect/>
+          </a:stretch>
+        </p:blipFill>
+        <p:spPr bwMode="auto">
+          <a:xfrm>
+            <a:off x="827584" y="1620103"/>
+            <a:ext cx="3455745" cy="654174"/>
+          </a:xfrm>
+          <a:prstGeom prst="rect">
+            <a:avLst/>
+          </a:prstGeom>
+          <a:noFill/>
+          <a:extLst>
+            <a:ext uri="{909E8E84-426E-40DD-AFC4-6F175D3DCCD1}">
+              <a14:hiddenFill xmlns:a14="http://schemas.microsoft.com/office/drawing/2010/main">
+                <a:solidFill>
+                  <a:srgbClr val="FFFFFF"/>
+                </a:solidFill>
+              </a14:hiddenFill>
+            </a:ext>
+          </a:extLst>
+        </p:spPr>
+      </p:pic>
+      <p:pic>
+        <p:nvPicPr>
+          <p:cNvPr id="2051" name="Picture 3" descr="C:\Users\Naver.AL00039501\Desktop\e8bf48efff04a116bf40b3172c344fe218af8f86.png"/>
+          <p:cNvPicPr>
+            <a:picLocks noChangeAspect="1" noChangeArrowheads="1"/>
+          </p:cNvPicPr>
+          <p:nvPr/>
+        </p:nvPicPr>
+        <p:blipFill>
+          <a:blip r:embed="rId4">
+            <a:extLst>
+              <a:ext uri="{28A0092B-C50C-407E-A947-70E740481C1C}">
+                <a14:useLocalDpi xmlns:a14="http://schemas.microsoft.com/office/drawing/2010/main" val="0"/>
+              </a:ext>
+            </a:extLst>
+          </a:blip>
+          <a:srcRect/>
+          <a:stretch>
+            <a:fillRect/>
+          </a:stretch>
+        </p:blipFill>
+        <p:spPr bwMode="auto">
+          <a:xfrm>
+            <a:off x="827584" y="3573016"/>
+            <a:ext cx="4561198" cy="835149"/>
+          </a:xfrm>
+          <a:prstGeom prst="rect">
+            <a:avLst/>
+          </a:prstGeom>
+          <a:noFill/>
+          <a:extLst>
+            <a:ext uri="{909E8E84-426E-40DD-AFC4-6F175D3DCCD1}">
+              <a14:hiddenFill xmlns:a14="http://schemas.microsoft.com/office/drawing/2010/main">
+                <a:solidFill>
+                  <a:srgbClr val="FFFFFF"/>
+                </a:solidFill>
+              </a14:hiddenFill>
+            </a:ext>
+          </a:extLst>
+        </p:spPr>
+      </p:pic>
+      <p:sp>
+        <p:nvSpPr>
+          <p:cNvPr id="6" name="TextBox 5"/>
+          <p:cNvSpPr txBox="1"/>
+          <p:nvPr/>
+        </p:nvSpPr>
+        <p:spPr>
+          <a:xfrm>
+            <a:off x="4932040" y="1412776"/>
+            <a:ext cx="3816424" cy="1200329"/>
+          </a:xfrm>
+          <a:prstGeom prst="rect">
+            <a:avLst/>
+          </a:prstGeom>
+          <a:noFill/>
+        </p:spPr>
+        <p:txBody>
+          <a:bodyPr wrap="square" rtlCol="0">
+            <a:spAutoFit/>
+          </a:bodyPr>
+          <a:lstStyle/>
+          <a:p>
+            <a:r>
+              <a:rPr lang="en-US" altLang="ko-KR" dirty="0" smtClean="0"/>
+              <a:t>D : </a:t>
+            </a:r>
+            <a:r>
+              <a:rPr lang="ko-KR" altLang="en-US" dirty="0" smtClean="0"/>
+              <a:t>전체 문서의 개수</a:t>
+            </a:r>
+            <a:endParaRPr lang="en-US" altLang="ko-KR" dirty="0" smtClean="0"/>
+          </a:p>
+          <a:p>
+            <a:r>
+              <a:rPr lang="ko-KR" altLang="en-US" dirty="0" smtClean="0"/>
+              <a:t>밑의 집합 수식 </a:t>
+            </a:r>
+            <a:r>
+              <a:rPr lang="en-US" altLang="ko-KR" dirty="0" smtClean="0"/>
+              <a:t>: </a:t>
+            </a:r>
+            <a:r>
+              <a:rPr lang="ko-KR" altLang="en-US" dirty="0" smtClean="0"/>
+              <a:t>단어 </a:t>
+            </a:r>
+            <a:r>
+              <a:rPr lang="en-US" altLang="ko-KR" dirty="0" smtClean="0"/>
+              <a:t>t</a:t>
+            </a:r>
+            <a:r>
+              <a:rPr lang="ko-KR" altLang="en-US" dirty="0" smtClean="0"/>
+              <a:t>를 포함한 문서의 개수</a:t>
+            </a:r>
+            <a:endParaRPr lang="en-US" altLang="ko-KR" dirty="0" smtClean="0"/>
+          </a:p>
+          <a:p>
+            <a:r>
+              <a:rPr lang="en-US" altLang="ko-KR" dirty="0" err="1"/>
+              <a:t>t</a:t>
+            </a:r>
+            <a:r>
+              <a:rPr lang="en-US" altLang="ko-KR" dirty="0" err="1" smtClean="0"/>
+              <a:t>f</a:t>
+            </a:r>
+            <a:r>
+              <a:rPr lang="en-US" altLang="ko-KR" dirty="0" smtClean="0"/>
+              <a:t> : </a:t>
+            </a:r>
+            <a:r>
+              <a:rPr lang="ko-KR" altLang="en-US" dirty="0" smtClean="0"/>
+              <a:t>문서 </a:t>
+            </a:r>
+            <a:r>
+              <a:rPr lang="en-US" altLang="ko-KR" dirty="0" smtClean="0"/>
+              <a:t>d</a:t>
+            </a:r>
+            <a:r>
+              <a:rPr lang="ko-KR" altLang="en-US" dirty="0" smtClean="0"/>
+              <a:t>에서 단어 </a:t>
+            </a:r>
+            <a:r>
+              <a:rPr lang="en-US" altLang="ko-KR" dirty="0" smtClean="0"/>
+              <a:t>t</a:t>
+            </a:r>
+            <a:r>
+              <a:rPr lang="ko-KR" altLang="en-US" dirty="0" smtClean="0"/>
+              <a:t>의 빈도수</a:t>
+            </a:r>
+            <a:endParaRPr lang="ko-KR" altLang="en-US" dirty="0"/>
+          </a:p>
+        </p:txBody>
+      </p:sp>
+      <p:sp>
+        <p:nvSpPr>
+          <p:cNvPr id="15" name="TextBox 14"/>
+          <p:cNvSpPr txBox="1"/>
+          <p:nvPr/>
+        </p:nvSpPr>
+        <p:spPr>
+          <a:xfrm>
+            <a:off x="5148064" y="4725144"/>
+            <a:ext cx="3816424" cy="369332"/>
+          </a:xfrm>
+          <a:prstGeom prst="rect">
+            <a:avLst/>
+          </a:prstGeom>
+          <a:noFill/>
+        </p:spPr>
+        <p:txBody>
+          <a:bodyPr wrap="square" rtlCol="0">
+            <a:spAutoFit/>
+          </a:bodyPr>
+          <a:lstStyle/>
+          <a:p>
+            <a:r>
+              <a:rPr lang="en-US" altLang="ko-KR" dirty="0" err="1" smtClean="0"/>
+              <a:t>Sim</a:t>
+            </a:r>
+            <a:r>
+              <a:rPr lang="en-US" altLang="ko-KR" dirty="0" smtClean="0"/>
+              <a:t>(</a:t>
+            </a:r>
+            <a:r>
+              <a:rPr lang="en-US" altLang="ko-KR" dirty="0" err="1" smtClean="0"/>
+              <a:t>dj,q</a:t>
+            </a:r>
+            <a:r>
+              <a:rPr lang="en-US" altLang="ko-KR" dirty="0" smtClean="0"/>
+              <a:t>) : </a:t>
+            </a:r>
+            <a:r>
+              <a:rPr lang="ko-KR" altLang="en-US" dirty="0" smtClean="0"/>
+              <a:t>문서 </a:t>
+            </a:r>
+            <a:r>
+              <a:rPr lang="en-US" altLang="ko-KR" dirty="0" err="1" smtClean="0"/>
+              <a:t>dj</a:t>
+            </a:r>
+            <a:r>
+              <a:rPr lang="ko-KR" altLang="en-US" dirty="0" smtClean="0"/>
+              <a:t>와 쿼리 </a:t>
+            </a:r>
+            <a:r>
+              <a:rPr lang="en-US" altLang="ko-KR" dirty="0" smtClean="0"/>
+              <a:t>q</a:t>
+            </a:r>
+            <a:r>
+              <a:rPr lang="ko-KR" altLang="en-US" dirty="0" smtClean="0"/>
+              <a:t>의 유사도</a:t>
+            </a:r>
+            <a:r>
+              <a:rPr lang="en-US" altLang="ko-KR" dirty="0" smtClean="0"/>
+              <a:t>.</a:t>
+            </a:r>
+            <a:endParaRPr lang="ko-KR" altLang="en-US" dirty="0"/>
+          </a:p>
+        </p:txBody>
+      </p:sp>
+    </p:spTree>
+    <p:extLst>
+      <p:ext uri="{BB962C8B-B14F-4D97-AF65-F5344CB8AC3E}">
+        <p14:creationId xmlns:p14="http://schemas.microsoft.com/office/powerpoint/2010/main" val="1163035718"/>
       </p:ext>
     </p:extLst>
   </p:cSld>

</xml_diff>